<commit_message>
remove time-dependent ref. to SVM
</commit_message>
<xml_diff>
--- a/18-dim_reduc/slides.pptx
+++ b/18-dim_reduc/slides.pptx
@@ -324,7 +324,7 @@
           <a:p>
             <a:fld id="{DB92F479-4B50-F243-9713-1B12EC2B4BDB}" type="datetimeFigureOut">
               <a:rPr lang="en-US" smtClean="0"/>
-              <a:t>5/4/14</a:t>
+              <a:t>8/31/14</a:t>
             </a:fld>
             <a:endParaRPr lang="en-US"/>
           </a:p>
@@ -9772,13 +9772,6 @@
               </a:rPr>
               <a:t>Diagonals set with communalities, etc.</a:t>
             </a:r>
-            <a:endParaRPr lang="en-US" sz="1200" baseline="0" dirty="0" smtClean="0">
-              <a:solidFill>
-                <a:prstClr val="black"/>
-              </a:solidFill>
-              <a:latin typeface="ArialMT"/>
-              <a:sym typeface="Wingdings"/>
-            </a:endParaRPr>
           </a:p>
         </p:txBody>
       </p:sp>
@@ -10114,7 +10107,17 @@
                 <a:latin typeface="ArialMT"/>
                 <a:sym typeface="Wingdings"/>
               </a:rPr>
-              <a:t> </a:t>
+              <a:t> (From </a:t>
+            </a:r>
+            <a:r>
+              <a:rPr lang="en-US" sz="1200" baseline="0" dirty="0" err="1" smtClean="0">
+                <a:solidFill>
+                  <a:prstClr val="black"/>
+                </a:solidFill>
+                <a:latin typeface="ArialMT"/>
+                <a:sym typeface="Wingdings"/>
+              </a:rPr>
+              <a:t>sklearn</a:t>
             </a:r>
             <a:r>
               <a:rPr lang="en-US" sz="1200" baseline="0" dirty="0" smtClean="0">
@@ -10124,35 +10127,8 @@
                 <a:latin typeface="ArialMT"/>
                 <a:sym typeface="Wingdings"/>
               </a:rPr>
-              <a:t>(From </a:t>
-            </a:r>
-            <a:r>
-              <a:rPr lang="en-US" sz="1200" baseline="0" dirty="0" err="1" smtClean="0">
-                <a:solidFill>
-                  <a:prstClr val="black"/>
-                </a:solidFill>
-                <a:latin typeface="ArialMT"/>
-                <a:sym typeface="Wingdings"/>
-              </a:rPr>
-              <a:t>sklearn</a:t>
-            </a:r>
-            <a:r>
-              <a:rPr lang="en-US" sz="1200" baseline="0" dirty="0" smtClean="0">
-                <a:solidFill>
-                  <a:prstClr val="black"/>
-                </a:solidFill>
-                <a:latin typeface="ArialMT"/>
-                <a:sym typeface="Wingdings"/>
-              </a:rPr>
               <a:t> kernel PCA example.)</a:t>
             </a:r>
-            <a:endParaRPr lang="en-US" sz="1200" baseline="0" dirty="0" smtClean="0">
-              <a:solidFill>
-                <a:prstClr val="black"/>
-              </a:solidFill>
-              <a:latin typeface="ArialMT"/>
-              <a:sym typeface="Wingdings"/>
-            </a:endParaRPr>
           </a:p>
         </p:txBody>
       </p:sp>
@@ -10531,7 +10507,17 @@
                 <a:latin typeface="ArialMT"/>
                 <a:sym typeface="Wingdings"/>
               </a:rPr>
-              <a:t> </a:t>
+              <a:t> manifold; </a:t>
+            </a:r>
+            <a:r>
+              <a:rPr lang="en-US" sz="1200" baseline="0" dirty="0" err="1" smtClean="0">
+                <a:solidFill>
+                  <a:prstClr val="black"/>
+                </a:solidFill>
+                <a:latin typeface="ArialMT"/>
+                <a:sym typeface="Wingdings"/>
+              </a:rPr>
+              <a:t>isomap</a:t>
             </a:r>
             <a:r>
               <a:rPr lang="en-US" sz="1200" baseline="0" dirty="0" smtClean="0">
@@ -10541,35 +10527,8 @@
                 <a:latin typeface="ArialMT"/>
                 <a:sym typeface="Wingdings"/>
               </a:rPr>
-              <a:t>manifold; </a:t>
-            </a:r>
-            <a:r>
-              <a:rPr lang="en-US" sz="1200" baseline="0" dirty="0" err="1" smtClean="0">
-                <a:solidFill>
-                  <a:prstClr val="black"/>
-                </a:solidFill>
-                <a:latin typeface="ArialMT"/>
-                <a:sym typeface="Wingdings"/>
-              </a:rPr>
-              <a:t>isomap</a:t>
-            </a:r>
-            <a:r>
-              <a:rPr lang="en-US" sz="1200" baseline="0" dirty="0" smtClean="0">
-                <a:solidFill>
-                  <a:prstClr val="black"/>
-                </a:solidFill>
-                <a:latin typeface="ArialMT"/>
-                <a:sym typeface="Wingdings"/>
-              </a:rPr>
               <a:t> adds some graph ideas</a:t>
             </a:r>
-            <a:endParaRPr lang="en-US" sz="1200" baseline="0" dirty="0" smtClean="0">
-              <a:solidFill>
-                <a:prstClr val="black"/>
-              </a:solidFill>
-              <a:latin typeface="ArialMT"/>
-              <a:sym typeface="Wingdings"/>
-            </a:endParaRPr>
           </a:p>
         </p:txBody>
       </p:sp>
@@ -10728,17 +10687,7 @@
                 <a:latin typeface="ArialMT"/>
                 <a:sym typeface="Wingdings"/>
               </a:rPr>
-              <a:t> </a:t>
-            </a:r>
-            <a:r>
-              <a:rPr lang="en-US" sz="1200" baseline="0" dirty="0" smtClean="0">
-                <a:solidFill>
-                  <a:prstClr val="black"/>
-                </a:solidFill>
-                <a:latin typeface="ArialMT"/>
-                <a:sym typeface="Wingdings"/>
-              </a:rPr>
-              <a:t>manifold; </a:t>
+              <a:t> manifold; </a:t>
             </a:r>
             <a:r>
               <a:rPr lang="en-US" sz="1200" baseline="0" dirty="0" err="1" smtClean="0">
@@ -11045,17 +10994,7 @@
                 <a:latin typeface="ArialMT"/>
                 <a:sym typeface="Wingdings"/>
               </a:rPr>
-              <a:t> </a:t>
-            </a:r>
-            <a:r>
-              <a:rPr lang="en-US" sz="1200" baseline="0" dirty="0" smtClean="0">
-                <a:solidFill>
-                  <a:prstClr val="black"/>
-                </a:solidFill>
-                <a:latin typeface="ArialMT"/>
-                <a:sym typeface="Wingdings"/>
-              </a:rPr>
-              <a:t>manifold; </a:t>
+              <a:t> manifold; </a:t>
             </a:r>
             <a:r>
               <a:rPr lang="en-US" sz="1200" baseline="0" dirty="0" err="1" smtClean="0">
@@ -35396,28 +35335,7 @@
                 <a:latin typeface="PFDinTextCompPro-Italic"/>
                 <a:cs typeface="PFDinTextCompPro-Italic"/>
               </a:rPr>
-              <a:t>Whereas PCA and SVD create new coordinates by transforming the old </a:t>
-            </a:r>
-            <a:r>
-              <a:rPr lang="en-US" sz="3000" dirty="0" smtClean="0">
-                <a:latin typeface="PFDinTextCompPro-Italic"/>
-                <a:cs typeface="PFDinTextCompPro-Italic"/>
-              </a:rPr>
-              <a:t>coordinates </a:t>
-            </a:r>
-            <a:r>
-              <a:rPr lang="en-US" sz="3000" dirty="0" smtClean="0">
-                <a:latin typeface="PFDinTextCompPro-Italic"/>
-                <a:cs typeface="PFDinTextCompPro-Italic"/>
-              </a:rPr>
-              <a:t>without any accompanying</a:t>
-            </a:r>
-            <a:r>
-              <a:rPr lang="en-US" sz="3000" dirty="0" smtClean="0">
-                <a:latin typeface="PFDinTextCompPro-Italic"/>
-                <a:cs typeface="PFDinTextCompPro-Italic"/>
-              </a:rPr>
-              <a:t> theory of what anything means, </a:t>
+              <a:t>Whereas PCA and SVD create new coordinates by transforming the old coordinates without any accompanying theory of what anything means, </a:t>
             </a:r>
             <a:r>
               <a:rPr lang="en-US" sz="3000" dirty="0" smtClean="0">
@@ -35431,14 +35349,7 @@
                 <a:latin typeface="PFDinTextCompPro-Italic"/>
                 <a:cs typeface="PFDinTextCompPro-Italic"/>
               </a:rPr>
-              <a:t> </a:t>
-            </a:r>
-            <a:r>
-              <a:rPr lang="en-US" sz="3000" dirty="0" smtClean="0">
-                <a:latin typeface="PFDinTextCompPro-Italic"/>
-                <a:cs typeface="PFDinTextCompPro-Italic"/>
-              </a:rPr>
-              <a:t>refers to a broader array of techniques.</a:t>
+              <a:t> refers to a broader array of techniques.</a:t>
             </a:r>
           </a:p>
         </p:txBody>
@@ -35572,28 +35483,7 @@
                 <a:latin typeface="PFDinTextCompPro-Italic"/>
                 <a:cs typeface="PFDinTextCompPro-Italic"/>
               </a:rPr>
-              <a:t>Whereas PCA and SVD create new coordinates by transforming the old </a:t>
-            </a:r>
-            <a:r>
-              <a:rPr lang="en-US" sz="3000" dirty="0" smtClean="0">
-                <a:latin typeface="PFDinTextCompPro-Italic"/>
-                <a:cs typeface="PFDinTextCompPro-Italic"/>
-              </a:rPr>
-              <a:t>coordinates </a:t>
-            </a:r>
-            <a:r>
-              <a:rPr lang="en-US" sz="3000" dirty="0" smtClean="0">
-                <a:latin typeface="PFDinTextCompPro-Italic"/>
-                <a:cs typeface="PFDinTextCompPro-Italic"/>
-              </a:rPr>
-              <a:t>without any accompanying</a:t>
-            </a:r>
-            <a:r>
-              <a:rPr lang="en-US" sz="3000" dirty="0" smtClean="0">
-                <a:latin typeface="PFDinTextCompPro-Italic"/>
-                <a:cs typeface="PFDinTextCompPro-Italic"/>
-              </a:rPr>
-              <a:t> theory of what anything means, </a:t>
+              <a:t>Whereas PCA and SVD create new coordinates by transforming the old coordinates without any accompanying theory of what anything means, </a:t>
             </a:r>
             <a:r>
               <a:rPr lang="en-US" sz="3000" dirty="0" smtClean="0">
@@ -35607,14 +35497,7 @@
                 <a:latin typeface="PFDinTextCompPro-Italic"/>
                 <a:cs typeface="PFDinTextCompPro-Italic"/>
               </a:rPr>
-              <a:t> </a:t>
-            </a:r>
-            <a:r>
-              <a:rPr lang="en-US" sz="3000" dirty="0" smtClean="0">
-                <a:latin typeface="PFDinTextCompPro-Italic"/>
-                <a:cs typeface="PFDinTextCompPro-Italic"/>
-              </a:rPr>
-              <a:t>refers to a broader array of techniques.</a:t>
+              <a:t> refers to a broader array of techniques.</a:t>
             </a:r>
           </a:p>
           <a:p>
@@ -35793,28 +35676,7 @@
                 <a:latin typeface="PFDinTextCompPro-Italic"/>
                 <a:cs typeface="PFDinTextCompPro-Italic"/>
               </a:rPr>
-              <a:t>Whereas PCA and SVD create new coordinates by transforming the old </a:t>
-            </a:r>
-            <a:r>
-              <a:rPr lang="en-US" sz="3000" dirty="0" smtClean="0">
-                <a:latin typeface="PFDinTextCompPro-Italic"/>
-                <a:cs typeface="PFDinTextCompPro-Italic"/>
-              </a:rPr>
-              <a:t>coordinates </a:t>
-            </a:r>
-            <a:r>
-              <a:rPr lang="en-US" sz="3000" dirty="0" smtClean="0">
-                <a:latin typeface="PFDinTextCompPro-Italic"/>
-                <a:cs typeface="PFDinTextCompPro-Italic"/>
-              </a:rPr>
-              <a:t>without any accompanying</a:t>
-            </a:r>
-            <a:r>
-              <a:rPr lang="en-US" sz="3000" dirty="0" smtClean="0">
-                <a:latin typeface="PFDinTextCompPro-Italic"/>
-                <a:cs typeface="PFDinTextCompPro-Italic"/>
-              </a:rPr>
-              <a:t> theory of what anything means, </a:t>
+              <a:t>Whereas PCA and SVD create new coordinates by transforming the old coordinates without any accompanying theory of what anything means, </a:t>
             </a:r>
             <a:r>
               <a:rPr lang="en-US" sz="3000" dirty="0" smtClean="0">
@@ -35828,14 +35690,7 @@
                 <a:latin typeface="PFDinTextCompPro-Italic"/>
                 <a:cs typeface="PFDinTextCompPro-Italic"/>
               </a:rPr>
-              <a:t> </a:t>
-            </a:r>
-            <a:r>
-              <a:rPr lang="en-US" sz="3000" dirty="0" smtClean="0">
-                <a:latin typeface="PFDinTextCompPro-Italic"/>
-                <a:cs typeface="PFDinTextCompPro-Italic"/>
-              </a:rPr>
-              <a:t>refers to a broader array of techniques.</a:t>
+              <a:t> refers to a broader array of techniques.</a:t>
             </a:r>
           </a:p>
           <a:p>
@@ -37093,7 +36948,7 @@
         <p:spPr>
           <a:xfrm>
             <a:off x="566737" y="952500"/>
-            <a:ext cx="8382000" cy="2862322"/>
+            <a:ext cx="8382000" cy="2400657"/>
           </a:xfrm>
           <a:prstGeom prst="rect">
             <a:avLst/>
@@ -37143,7 +36998,21 @@
                 <a:latin typeface="PFDinTextCompPro-Italic"/>
                 <a:cs typeface="PFDinTextCompPro-Italic"/>
               </a:rPr>
-              <a:t>But as we saw with SVM’s, sometimes linear techniques are not sufficient.</a:t>
+              <a:t>But </a:t>
+            </a:r>
+            <a:r>
+              <a:rPr lang="en-US" sz="3000" dirty="0" smtClean="0">
+                <a:latin typeface="PFDinTextCompPro-Italic"/>
+                <a:cs typeface="PFDinTextCompPro-Italic"/>
+              </a:rPr>
+              <a:t>sometimes </a:t>
+            </a:r>
+            <a:r>
+              <a:rPr lang="en-US" sz="3000" dirty="0" smtClean="0">
+                <a:latin typeface="PFDinTextCompPro-Italic"/>
+                <a:cs typeface="PFDinTextCompPro-Italic"/>
+              </a:rPr>
+              <a:t>linear techniques are not sufficient.</a:t>
             </a:r>
           </a:p>
         </p:txBody>
@@ -37613,14 +37482,7 @@
                 <a:latin typeface="PFDinTextCompPro-Italic"/>
                 <a:cs typeface="PFDinTextCompPro-Italic"/>
               </a:rPr>
-              <a:t>: approximates local structure of data </a:t>
-            </a:r>
-            <a:r>
-              <a:rPr lang="en-US" sz="3000" dirty="0" smtClean="0">
-                <a:latin typeface="PFDinTextCompPro-Italic"/>
-                <a:cs typeface="PFDinTextCompPro-Italic"/>
-              </a:rPr>
-              <a:t>	(neighborhood</a:t>
+              <a:t>: approximates local structure of data 	(neighborhood</a:t>
             </a:r>
             <a:r>
               <a:rPr lang="en-US" sz="3000" dirty="0">
@@ -37634,14 +37496,7 @@
                 <a:latin typeface="PFDinTextCompPro-Italic"/>
                 <a:cs typeface="PFDinTextCompPro-Italic"/>
               </a:rPr>
-              <a:t>preserving </a:t>
-            </a:r>
-            <a:r>
-              <a:rPr lang="en-US" sz="3000" dirty="0" smtClean="0">
-                <a:latin typeface="PFDinTextCompPro-Italic"/>
-                <a:cs typeface="PFDinTextCompPro-Italic"/>
-              </a:rPr>
-              <a:t>embedding)</a:t>
+              <a:t>preserving embedding)</a:t>
             </a:r>
           </a:p>
         </p:txBody>
@@ -37865,14 +37720,7 @@
                 <a:latin typeface="PFDinTextCompPro-Italic"/>
                 <a:cs typeface="PFDinTextCompPro-Italic"/>
               </a:rPr>
-              <a:t>preserving </a:t>
-            </a:r>
-            <a:r>
-              <a:rPr lang="en-US" sz="3000" dirty="0" smtClean="0">
-                <a:latin typeface="PFDinTextCompPro-Italic"/>
-                <a:cs typeface="PFDinTextCompPro-Italic"/>
-              </a:rPr>
-              <a:t>embedding)</a:t>
+              <a:t>preserving embedding)</a:t>
             </a:r>
           </a:p>
         </p:txBody>
@@ -38289,14 +38137,7 @@
                 <a:latin typeface="PFDinTextCompPro-Italic"/>
                 <a:cs typeface="PFDinTextCompPro-Italic"/>
               </a:rPr>
-              <a:t>: exploits PCA dependence on inner </a:t>
-            </a:r>
-            <a:r>
-              <a:rPr lang="en-US" sz="3000" dirty="0" smtClean="0">
-                <a:latin typeface="PFDinTextCompPro-Italic"/>
-                <a:cs typeface="PFDinTextCompPro-Italic"/>
-              </a:rPr>
-              <a:t>product</a:t>
+              <a:t>: exploits PCA dependence on inner product</a:t>
             </a:r>
           </a:p>
           <a:p>
@@ -38313,28 +38154,7 @@
                 <a:latin typeface="PFDinTextCompPro-Italic"/>
                 <a:cs typeface="PFDinTextCompPro-Italic"/>
               </a:rPr>
-              <a:t>(</a:t>
-            </a:r>
-            <a:r>
-              <a:rPr lang="en-US" sz="3000" dirty="0" smtClean="0">
-                <a:latin typeface="PFDinTextCompPro-Italic"/>
-                <a:cs typeface="PFDinTextCompPro-Italic"/>
-              </a:rPr>
-              <a:t>same logic </a:t>
-            </a:r>
-            <a:r>
-              <a:rPr lang="en-US" sz="3000" dirty="0" smtClean="0">
-                <a:latin typeface="PFDinTextCompPro-Italic"/>
-                <a:cs typeface="PFDinTextCompPro-Italic"/>
-              </a:rPr>
-              <a:t>as SVM</a:t>
-            </a:r>
-            <a:r>
-              <a:rPr lang="en-US" sz="3000" dirty="0" smtClean="0">
-                <a:latin typeface="PFDinTextCompPro-Italic"/>
-                <a:cs typeface="PFDinTextCompPro-Italic"/>
-              </a:rPr>
-              <a:t>)</a:t>
+              <a:t>(same logic as SVM)</a:t>
             </a:r>
             <a:endParaRPr lang="en-US" sz="3000" dirty="0">
               <a:latin typeface="PFDinTextCompPro-Italic"/>
@@ -38362,49 +38182,7 @@
                 <a:latin typeface="PFDinTextCompPro-Italic"/>
                 <a:cs typeface="PFDinTextCompPro-Italic"/>
               </a:rPr>
-              <a:t>: nonlinear </a:t>
-            </a:r>
-            <a:r>
-              <a:rPr lang="en-US" sz="3000" dirty="0" smtClean="0">
-                <a:latin typeface="PFDinTextCompPro-Italic"/>
-                <a:cs typeface="PFDinTextCompPro-Italic"/>
-              </a:rPr>
-              <a:t>dimension </a:t>
-            </a:r>
-            <a:r>
-              <a:rPr lang="en-US" sz="3000" dirty="0" smtClean="0">
-                <a:latin typeface="PFDinTextCompPro-Italic"/>
-                <a:cs typeface="PFDinTextCompPro-Italic"/>
-              </a:rPr>
-              <a:t>reduction via MDS using geodesic </a:t>
-            </a:r>
-            <a:r>
-              <a:rPr lang="en-US" sz="3000" dirty="0" smtClean="0">
-                <a:latin typeface="PFDinTextCompPro-Italic"/>
-                <a:cs typeface="PFDinTextCompPro-Italic"/>
-              </a:rPr>
-              <a:t>	(</a:t>
-            </a:r>
-            <a:r>
-              <a:rPr lang="en-US" sz="3000" dirty="0" smtClean="0">
-                <a:latin typeface="PFDinTextCompPro-Italic"/>
-                <a:cs typeface="PFDinTextCompPro-Italic"/>
-              </a:rPr>
-              <a:t>surface</a:t>
-            </a:r>
-            <a:r>
-              <a:rPr lang="en-US" sz="3000" dirty="0" smtClean="0">
-                <a:latin typeface="PFDinTextCompPro-Italic"/>
-                <a:cs typeface="PFDinTextCompPro-Italic"/>
-              </a:rPr>
-              <a:t>-bound</a:t>
-            </a:r>
-            <a:r>
-              <a:rPr lang="en-US" sz="3000" dirty="0" smtClean="0">
-                <a:latin typeface="PFDinTextCompPro-Italic"/>
-                <a:cs typeface="PFDinTextCompPro-Italic"/>
-              </a:rPr>
-              <a:t>) distances</a:t>
+              <a:t>: nonlinear dimension reduction via MDS using geodesic 	(surface-bound) distances</a:t>
             </a:r>
           </a:p>
         </p:txBody>
@@ -38576,14 +38354,7 @@
                 <a:latin typeface="PFDinTextCompPro-Italic"/>
                 <a:cs typeface="PFDinTextCompPro-Italic"/>
               </a:rPr>
-              <a:t>: exploits PCA dependence on inner </a:t>
-            </a:r>
-            <a:r>
-              <a:rPr lang="en-US" sz="3000" dirty="0" smtClean="0">
-                <a:latin typeface="PFDinTextCompPro-Italic"/>
-                <a:cs typeface="PFDinTextCompPro-Italic"/>
-              </a:rPr>
-              <a:t>product</a:t>
+              <a:t>: exploits PCA dependence on inner product</a:t>
             </a:r>
           </a:p>
           <a:p>
@@ -38600,28 +38371,7 @@
                 <a:latin typeface="PFDinTextCompPro-Italic"/>
                 <a:cs typeface="PFDinTextCompPro-Italic"/>
               </a:rPr>
-              <a:t>(</a:t>
-            </a:r>
-            <a:r>
-              <a:rPr lang="en-US" sz="3000" dirty="0" smtClean="0">
-                <a:latin typeface="PFDinTextCompPro-Italic"/>
-                <a:cs typeface="PFDinTextCompPro-Italic"/>
-              </a:rPr>
-              <a:t>same logic </a:t>
-            </a:r>
-            <a:r>
-              <a:rPr lang="en-US" sz="3000" dirty="0" smtClean="0">
-                <a:latin typeface="PFDinTextCompPro-Italic"/>
-                <a:cs typeface="PFDinTextCompPro-Italic"/>
-              </a:rPr>
-              <a:t>as SVM</a:t>
-            </a:r>
-            <a:r>
-              <a:rPr lang="en-US" sz="3000" dirty="0" smtClean="0">
-                <a:latin typeface="PFDinTextCompPro-Italic"/>
-                <a:cs typeface="PFDinTextCompPro-Italic"/>
-              </a:rPr>
-              <a:t>)</a:t>
+              <a:t>(same logic as SVM)</a:t>
             </a:r>
             <a:endParaRPr lang="en-US" sz="3000" dirty="0">
               <a:latin typeface="PFDinTextCompPro-Italic"/>
@@ -38649,49 +38399,7 @@
                 <a:latin typeface="PFDinTextCompPro-Italic"/>
                 <a:cs typeface="PFDinTextCompPro-Italic"/>
               </a:rPr>
-              <a:t>: nonlinear </a:t>
-            </a:r>
-            <a:r>
-              <a:rPr lang="en-US" sz="3000" dirty="0" smtClean="0">
-                <a:latin typeface="PFDinTextCompPro-Italic"/>
-                <a:cs typeface="PFDinTextCompPro-Italic"/>
-              </a:rPr>
-              <a:t>dimension </a:t>
-            </a:r>
-            <a:r>
-              <a:rPr lang="en-US" sz="3000" dirty="0" smtClean="0">
-                <a:latin typeface="PFDinTextCompPro-Italic"/>
-                <a:cs typeface="PFDinTextCompPro-Italic"/>
-              </a:rPr>
-              <a:t>reduction via MDS using geodesic </a:t>
-            </a:r>
-            <a:r>
-              <a:rPr lang="en-US" sz="3000" dirty="0" smtClean="0">
-                <a:latin typeface="PFDinTextCompPro-Italic"/>
-                <a:cs typeface="PFDinTextCompPro-Italic"/>
-              </a:rPr>
-              <a:t>	(</a:t>
-            </a:r>
-            <a:r>
-              <a:rPr lang="en-US" sz="3000" dirty="0" smtClean="0">
-                <a:latin typeface="PFDinTextCompPro-Italic"/>
-                <a:cs typeface="PFDinTextCompPro-Italic"/>
-              </a:rPr>
-              <a:t>surface</a:t>
-            </a:r>
-            <a:r>
-              <a:rPr lang="en-US" sz="3000" dirty="0" smtClean="0">
-                <a:latin typeface="PFDinTextCompPro-Italic"/>
-                <a:cs typeface="PFDinTextCompPro-Italic"/>
-              </a:rPr>
-              <a:t>-bound</a:t>
-            </a:r>
-            <a:r>
-              <a:rPr lang="en-US" sz="3000" dirty="0" smtClean="0">
-                <a:latin typeface="PFDinTextCompPro-Italic"/>
-                <a:cs typeface="PFDinTextCompPro-Italic"/>
-              </a:rPr>
-              <a:t>) distances</a:t>
+              <a:t>: nonlinear dimension reduction via MDS using geodesic 	(surface-bound) distances</a:t>
             </a:r>
           </a:p>
         </p:txBody>
@@ -39297,14 +39005,7 @@
                 <a:latin typeface="PFDinTextCompPro-Italic"/>
                 <a:cs typeface="PFDinTextCompPro-Italic"/>
               </a:rPr>
-              <a:t>: exploits PCA dependence on inner </a:t>
-            </a:r>
-            <a:r>
-              <a:rPr lang="en-US" sz="3000" dirty="0" smtClean="0">
-                <a:latin typeface="PFDinTextCompPro-Italic"/>
-                <a:cs typeface="PFDinTextCompPro-Italic"/>
-              </a:rPr>
-              <a:t>product</a:t>
+              <a:t>: exploits PCA dependence on inner product</a:t>
             </a:r>
           </a:p>
           <a:p>
@@ -39321,28 +39022,7 @@
                 <a:latin typeface="PFDinTextCompPro-Italic"/>
                 <a:cs typeface="PFDinTextCompPro-Italic"/>
               </a:rPr>
-              <a:t>(</a:t>
-            </a:r>
-            <a:r>
-              <a:rPr lang="en-US" sz="3000" dirty="0" smtClean="0">
-                <a:latin typeface="PFDinTextCompPro-Italic"/>
-                <a:cs typeface="PFDinTextCompPro-Italic"/>
-              </a:rPr>
-              <a:t>same logic </a:t>
-            </a:r>
-            <a:r>
-              <a:rPr lang="en-US" sz="3000" dirty="0" smtClean="0">
-                <a:latin typeface="PFDinTextCompPro-Italic"/>
-                <a:cs typeface="PFDinTextCompPro-Italic"/>
-              </a:rPr>
-              <a:t>as SVM</a:t>
-            </a:r>
-            <a:r>
-              <a:rPr lang="en-US" sz="3000" dirty="0" smtClean="0">
-                <a:latin typeface="PFDinTextCompPro-Italic"/>
-                <a:cs typeface="PFDinTextCompPro-Italic"/>
-              </a:rPr>
-              <a:t>)</a:t>
+              <a:t>(same logic as SVM)</a:t>
             </a:r>
             <a:endParaRPr lang="en-US" sz="3000" dirty="0">
               <a:latin typeface="PFDinTextCompPro-Italic"/>
@@ -39370,49 +39050,7 @@
                 <a:latin typeface="PFDinTextCompPro-Italic"/>
                 <a:cs typeface="PFDinTextCompPro-Italic"/>
               </a:rPr>
-              <a:t>: nonlinear </a:t>
-            </a:r>
-            <a:r>
-              <a:rPr lang="en-US" sz="3000" dirty="0" smtClean="0">
-                <a:latin typeface="PFDinTextCompPro-Italic"/>
-                <a:cs typeface="PFDinTextCompPro-Italic"/>
-              </a:rPr>
-              <a:t>dimension </a:t>
-            </a:r>
-            <a:r>
-              <a:rPr lang="en-US" sz="3000" dirty="0" smtClean="0">
-                <a:latin typeface="PFDinTextCompPro-Italic"/>
-                <a:cs typeface="PFDinTextCompPro-Italic"/>
-              </a:rPr>
-              <a:t>reduction via MDS using geodesic </a:t>
-            </a:r>
-            <a:r>
-              <a:rPr lang="en-US" sz="3000" dirty="0" smtClean="0">
-                <a:latin typeface="PFDinTextCompPro-Italic"/>
-                <a:cs typeface="PFDinTextCompPro-Italic"/>
-              </a:rPr>
-              <a:t>	(</a:t>
-            </a:r>
-            <a:r>
-              <a:rPr lang="en-US" sz="3000" dirty="0" smtClean="0">
-                <a:latin typeface="PFDinTextCompPro-Italic"/>
-                <a:cs typeface="PFDinTextCompPro-Italic"/>
-              </a:rPr>
-              <a:t>surface</a:t>
-            </a:r>
-            <a:r>
-              <a:rPr lang="en-US" sz="3000" dirty="0" smtClean="0">
-                <a:latin typeface="PFDinTextCompPro-Italic"/>
-                <a:cs typeface="PFDinTextCompPro-Italic"/>
-              </a:rPr>
-              <a:t>-bound</a:t>
-            </a:r>
-            <a:r>
-              <a:rPr lang="en-US" sz="3000" dirty="0" smtClean="0">
-                <a:latin typeface="PFDinTextCompPro-Italic"/>
-                <a:cs typeface="PFDinTextCompPro-Italic"/>
-              </a:rPr>
-              <a:t>) distances</a:t>
+              <a:t>: nonlinear dimension reduction via MDS using geodesic 	(surface-bound) distances</a:t>
             </a:r>
           </a:p>
         </p:txBody>
@@ -40048,21 +39686,7 @@
                 <a:latin typeface="PFDinTextCompPro-Italic"/>
                 <a:cs typeface="PFDinTextCompPro-Italic"/>
               </a:rPr>
-              <a:t>In any case, </a:t>
-            </a:r>
-            <a:r>
-              <a:rPr lang="en-US" sz="3000" dirty="0" smtClean="0">
-                <a:latin typeface="PFDinTextCompPro-Italic"/>
-                <a:cs typeface="PFDinTextCompPro-Italic"/>
-              </a:rPr>
-              <a:t>key </a:t>
-            </a:r>
-            <a:r>
-              <a:rPr lang="en-US" sz="3000" dirty="0" smtClean="0">
-                <a:latin typeface="PFDinTextCompPro-Italic"/>
-                <a:cs typeface="PFDinTextCompPro-Italic"/>
-              </a:rPr>
-              <a:t>difficulties with dimensionality reduction are time/space complexity, randomness (</a:t>
+              <a:t>In any case, key difficulties with dimensionality reduction are time/space complexity, randomness (</a:t>
             </a:r>
             <a:r>
               <a:rPr lang="en-US" sz="3000" dirty="0" err="1" smtClean="0">
@@ -40210,21 +39834,7 @@
                 <a:latin typeface="PFDinTextCompPro-Italic"/>
                 <a:cs typeface="PFDinTextCompPro-Italic"/>
               </a:rPr>
-              <a:t>In any case, </a:t>
-            </a:r>
-            <a:r>
-              <a:rPr lang="en-US" sz="3000" dirty="0" smtClean="0">
-                <a:latin typeface="PFDinTextCompPro-Italic"/>
-                <a:cs typeface="PFDinTextCompPro-Italic"/>
-              </a:rPr>
-              <a:t>key </a:t>
-            </a:r>
-            <a:r>
-              <a:rPr lang="en-US" sz="3000" dirty="0" smtClean="0">
-                <a:latin typeface="PFDinTextCompPro-Italic"/>
-                <a:cs typeface="PFDinTextCompPro-Italic"/>
-              </a:rPr>
-              <a:t>difficulties with dimensionality reduction are time/space complexity, randomness (</a:t>
+              <a:t>In any case, key difficulties with dimensionality reduction are time/space complexity, randomness (</a:t>
             </a:r>
             <a:r>
               <a:rPr lang="en-US" sz="3000" dirty="0" err="1" smtClean="0">
@@ -40255,21 +39865,7 @@
                 <a:latin typeface="PFDinTextCompPro-Italic"/>
                 <a:cs typeface="PFDinTextCompPro-Italic"/>
               </a:rPr>
-              <a:t>Furthermore, there’s an obvious (bias/variance) tradeoff </a:t>
-            </a:r>
-            <a:r>
-              <a:rPr lang="en-US" sz="3000" dirty="0" smtClean="0">
-                <a:latin typeface="PFDinTextCompPro-Italic"/>
-                <a:cs typeface="PFDinTextCompPro-Italic"/>
-              </a:rPr>
-              <a:t>involved with the </a:t>
-            </a:r>
-            <a:r>
-              <a:rPr lang="en-US" sz="3000" dirty="0" smtClean="0">
-                <a:latin typeface="PFDinTextCompPro-Italic"/>
-                <a:cs typeface="PFDinTextCompPro-Italic"/>
-              </a:rPr>
-              <a:t>number of subspace dimensions and the size of approximation error.</a:t>
+              <a:t>Furthermore, there’s an obvious (bias/variance) tradeoff involved with the number of subspace dimensions and the size of approximation error.</a:t>
             </a:r>
           </a:p>
         </p:txBody>

</xml_diff>

<commit_message>
standardize notation to X for raw data
</commit_message>
<xml_diff>
--- a/18-dim_reduc/slides.pptx
+++ b/18-dim_reduc/slides.pptx
@@ -21123,81 +21123,95 @@
               <a:t> matrix </a:t>
             </a:r>
             <a:r>
+              <a:rPr lang="en-US" sz="2500" i="1" dirty="0">
+                <a:latin typeface="+mn-lt"/>
+                <a:cs typeface="PFDinTextCompPro-Italic"/>
+              </a:rPr>
+              <a:t>X</a:t>
+            </a:r>
+            <a:r>
+              <a:rPr lang="en-US" sz="3000" dirty="0" smtClean="0">
+                <a:latin typeface="PFDinTextCompPro-Italic"/>
+                <a:cs typeface="PFDinTextCompPro-Italic"/>
+              </a:rPr>
+              <a:t> </a:t>
+            </a:r>
+            <a:r>
+              <a:rPr lang="en-US" sz="3000" dirty="0" smtClean="0">
+                <a:latin typeface="PFDinTextCompPro-Italic"/>
+                <a:cs typeface="PFDinTextCompPro-Italic"/>
+              </a:rPr>
+              <a:t>(encoding </a:t>
+            </a:r>
+            <a:r>
               <a:rPr lang="en-US" sz="2500" i="1" dirty="0" smtClean="0">
                 <a:latin typeface="+mn-lt"/>
                 <a:cs typeface="PFDinTextCompPro-Italic"/>
               </a:rPr>
-              <a:t>A</a:t>
-            </a:r>
-            <a:r>
-              <a:rPr lang="en-US" sz="3000" dirty="0" smtClean="0">
-                <a:latin typeface="PFDinTextCompPro-Italic"/>
-                <a:cs typeface="PFDinTextCompPro-Italic"/>
-              </a:rPr>
-              <a:t> (encoding </a:t>
+              <a:t>n</a:t>
+            </a:r>
+            <a:r>
+              <a:rPr lang="en-US" sz="3000" dirty="0" smtClean="0">
+                <a:latin typeface="PFDinTextCompPro-Italic"/>
+                <a:cs typeface="PFDinTextCompPro-Italic"/>
+              </a:rPr>
+              <a:t> observations of a </a:t>
             </a:r>
             <a:r>
               <a:rPr lang="en-US" sz="2500" i="1" dirty="0" smtClean="0">
                 <a:latin typeface="+mn-lt"/>
                 <a:cs typeface="PFDinTextCompPro-Italic"/>
               </a:rPr>
-              <a:t>n</a:t>
-            </a:r>
-            <a:r>
-              <a:rPr lang="en-US" sz="3000" dirty="0" smtClean="0">
-                <a:latin typeface="PFDinTextCompPro-Italic"/>
-                <a:cs typeface="PFDinTextCompPro-Italic"/>
-              </a:rPr>
-              <a:t> observations of a </a:t>
+              <a:t>d</a:t>
+            </a:r>
+            <a:r>
+              <a:rPr lang="en-US" sz="3000" dirty="0" smtClean="0">
+                <a:latin typeface="PFDinTextCompPro-Italic"/>
+                <a:cs typeface="PFDinTextCompPro-Italic"/>
+              </a:rPr>
+              <a:t>-dimensional random variable), we want to find </a:t>
+            </a:r>
+            <a:r>
+              <a:rPr lang="en-US" sz="3000" dirty="0">
+                <a:latin typeface="PFDinTextCompPro-Italic"/>
+                <a:cs typeface="PFDinTextCompPro-Italic"/>
+              </a:rPr>
+              <a:t>a </a:t>
             </a:r>
             <a:r>
               <a:rPr lang="en-US" sz="2500" i="1" dirty="0" smtClean="0">
                 <a:latin typeface="+mn-lt"/>
                 <a:cs typeface="PFDinTextCompPro-Italic"/>
               </a:rPr>
-              <a:t>d</a:t>
-            </a:r>
-            <a:r>
-              <a:rPr lang="en-US" sz="3000" dirty="0" smtClean="0">
-                <a:latin typeface="PFDinTextCompPro-Italic"/>
-                <a:cs typeface="PFDinTextCompPro-Italic"/>
-              </a:rPr>
-              <a:t>-dimensional random variable), we want to find </a:t>
-            </a:r>
-            <a:r>
-              <a:rPr lang="en-US" sz="3000" dirty="0">
-                <a:latin typeface="PFDinTextCompPro-Italic"/>
-                <a:cs typeface="PFDinTextCompPro-Italic"/>
-              </a:rPr>
-              <a:t>a </a:t>
-            </a:r>
-            <a:r>
-              <a:rPr lang="en-US" sz="2500" i="1" dirty="0" smtClean="0">
+              <a:t>k</a:t>
+            </a:r>
+            <a:r>
+              <a:rPr lang="en-US" sz="3000" dirty="0" smtClean="0">
+                <a:latin typeface="PFDinTextCompPro-Italic"/>
+                <a:cs typeface="PFDinTextCompPro-Italic"/>
+              </a:rPr>
+              <a:t>-dimensional representation of </a:t>
+            </a:r>
+            <a:r>
+              <a:rPr lang="en-US" sz="2500" i="1" dirty="0">
                 <a:latin typeface="+mn-lt"/>
                 <a:cs typeface="PFDinTextCompPro-Italic"/>
               </a:rPr>
-              <a:t>k</a:t>
-            </a:r>
-            <a:r>
-              <a:rPr lang="en-US" sz="3000" dirty="0" smtClean="0">
-                <a:latin typeface="PFDinTextCompPro-Italic"/>
-                <a:cs typeface="PFDinTextCompPro-Italic"/>
-              </a:rPr>
-              <a:t>-dimensional representation of </a:t>
-            </a:r>
-            <a:r>
-              <a:rPr lang="en-US" sz="2500" i="1" dirty="0" smtClean="0">
-                <a:latin typeface="+mn-lt"/>
-                <a:cs typeface="PFDinTextCompPro-Italic"/>
-              </a:rPr>
-              <a:t>A</a:t>
-            </a:r>
-            <a:r>
-              <a:rPr lang="en-US" sz="3000" dirty="0" smtClean="0">
-                <a:latin typeface="PFDinTextCompPro-Italic"/>
-                <a:cs typeface="PFDinTextCompPro-Italic"/>
-              </a:rPr>
-              <a:t> (</a:t>
+              <a:t>X</a:t>
+            </a:r>
+            <a:r>
+              <a:rPr lang="en-US" sz="3000" dirty="0" smtClean="0">
+                <a:latin typeface="PFDinTextCompPro-Italic"/>
+                <a:cs typeface="PFDinTextCompPro-Italic"/>
+              </a:rPr>
+              <a:t> </a:t>
+            </a:r>
+            <a:r>
+              <a:rPr lang="en-US" sz="3000" dirty="0" smtClean="0">
+                <a:latin typeface="PFDinTextCompPro-Italic"/>
+                <a:cs typeface="PFDinTextCompPro-Italic"/>
+              </a:rPr>
+              <a:t>(</a:t>
             </a:r>
             <a:r>
               <a:rPr lang="en-US" sz="2500" i="1" dirty="0" smtClean="0">
@@ -24458,18 +24472,25 @@
               <a:t>The PCA of a matrix </a:t>
             </a:r>
             <a:r>
-              <a:rPr lang="en-US" sz="2500" i="1" dirty="0" smtClean="0">
+              <a:rPr lang="en-US" sz="2500" i="1" dirty="0">
                 <a:latin typeface="+mn-lt"/>
                 <a:cs typeface="PFDinTextCompPro-Italic"/>
               </a:rPr>
-              <a:t>A</a:t>
-            </a:r>
-            <a:r>
-              <a:rPr lang="en-US" sz="3000" dirty="0" smtClean="0">
-                <a:latin typeface="PFDinTextCompPro-Italic"/>
-                <a:cs typeface="PFDinTextCompPro-Italic"/>
-              </a:rPr>
-              <a:t> boils down to the </a:t>
+              <a:t>X</a:t>
+            </a:r>
+            <a:r>
+              <a:rPr lang="en-US" sz="3000" dirty="0" smtClean="0">
+                <a:latin typeface="PFDinTextCompPro-Italic"/>
+                <a:cs typeface="PFDinTextCompPro-Italic"/>
+              </a:rPr>
+              <a:t> </a:t>
+            </a:r>
+            <a:r>
+              <a:rPr lang="en-US" sz="3000" dirty="0" smtClean="0">
+                <a:latin typeface="PFDinTextCompPro-Italic"/>
+                <a:cs typeface="PFDinTextCompPro-Italic"/>
+              </a:rPr>
+              <a:t>boils down to the </a:t>
             </a:r>
             <a:r>
               <a:rPr lang="en-US" sz="3000" dirty="0" smtClean="0">
@@ -24500,11 +24521,11 @@
               <a:t> of </a:t>
             </a:r>
             <a:r>
-              <a:rPr lang="en-US" sz="2500" i="1" dirty="0" smtClean="0">
+              <a:rPr lang="en-US" sz="2500" i="1" dirty="0">
                 <a:latin typeface="+mn-lt"/>
                 <a:cs typeface="PFDinTextCompPro-Italic"/>
               </a:rPr>
-              <a:t>A</a:t>
+              <a:t>X</a:t>
             </a:r>
             <a:r>
               <a:rPr lang="en-US" sz="3000" dirty="0" smtClean="0">
@@ -24513,6 +24534,10 @@
               </a:rPr>
               <a:t>.</a:t>
             </a:r>
+            <a:endParaRPr lang="en-US" sz="3000" dirty="0" smtClean="0">
+              <a:latin typeface="PFDinTextCompPro-Italic"/>
+              <a:cs typeface="PFDinTextCompPro-Italic"/>
+            </a:endParaRPr>
           </a:p>
         </p:txBody>
       </p:sp>
@@ -24662,18 +24687,25 @@
               <a:t> of a matrix </a:t>
             </a:r>
             <a:r>
-              <a:rPr lang="en-US" sz="2500" i="1" dirty="0" smtClean="0">
+              <a:rPr lang="en-US" sz="2500" i="1" dirty="0">
                 <a:latin typeface="+mn-lt"/>
                 <a:cs typeface="PFDinTextCompPro-Italic"/>
               </a:rPr>
-              <a:t>A</a:t>
-            </a:r>
-            <a:r>
-              <a:rPr lang="en-US" sz="3000" dirty="0" smtClean="0">
-                <a:latin typeface="PFDinTextCompPro-Italic"/>
-                <a:cs typeface="PFDinTextCompPro-Italic"/>
-              </a:rPr>
-              <a:t> is always square:</a:t>
+              <a:t>X</a:t>
+            </a:r>
+            <a:r>
+              <a:rPr lang="en-US" sz="3000" dirty="0" smtClean="0">
+                <a:latin typeface="PFDinTextCompPro-Italic"/>
+                <a:cs typeface="PFDinTextCompPro-Italic"/>
+              </a:rPr>
+              <a:t> </a:t>
+            </a:r>
+            <a:r>
+              <a:rPr lang="en-US" sz="3000" dirty="0" smtClean="0">
+                <a:latin typeface="PFDinTextCompPro-Italic"/>
+                <a:cs typeface="PFDinTextCompPro-Italic"/>
+              </a:rPr>
+              <a:t>is always square:</a:t>
             </a:r>
           </a:p>
           <a:p>
@@ -25057,27 +25089,48 @@
               <a:t> of a square matrix </a:t>
             </a:r>
             <a:r>
-              <a:rPr lang="en-US" sz="2500" i="1" dirty="0" smtClean="0">
+              <a:rPr lang="en-US" sz="2500" i="1" dirty="0">
                 <a:latin typeface="+mn-lt"/>
                 <a:cs typeface="PFDinTextCompPro-Italic"/>
               </a:rPr>
-              <a:t>A</a:t>
-            </a:r>
-            <a:r>
-              <a:rPr lang="en-US" sz="3000" dirty="0" smtClean="0">
-                <a:latin typeface="PFDinTextCompPro-Italic"/>
-                <a:cs typeface="PFDinTextCompPro-Italic"/>
-              </a:rPr>
-              <a:t> is given by:</a:t>
-            </a:r>
-          </a:p>
-          <a:p>
+              <a:t>C</a:t>
+            </a:r>
+            <a:r>
+              <a:rPr lang="en-US" sz="3000" dirty="0" smtClean="0">
+                <a:latin typeface="PFDinTextCompPro-Italic"/>
+                <a:cs typeface="PFDinTextCompPro-Italic"/>
+              </a:rPr>
+              <a:t> </a:t>
+            </a:r>
+            <a:r>
+              <a:rPr lang="en-US" sz="3000" dirty="0" smtClean="0">
+                <a:latin typeface="PFDinTextCompPro-Italic"/>
+                <a:cs typeface="PFDinTextCompPro-Italic"/>
+              </a:rPr>
+              <a:t>is given by:</a:t>
+            </a:r>
+          </a:p>
+          <a:p>
+            <a:r>
+              <a:rPr lang="en-US" sz="3000" i="1" spc="300" dirty="0">
+                <a:latin typeface="+mn-lt"/>
+                <a:cs typeface="PFDinTextCompPro-Italic"/>
+              </a:rPr>
+              <a:t>C</a:t>
+            </a:r>
             <a:r>
               <a:rPr lang="en-US" sz="3000" i="1" spc="300" dirty="0" smtClean="0">
                 <a:latin typeface="+mn-lt"/>
                 <a:cs typeface="PFDinTextCompPro-Italic"/>
               </a:rPr>
-              <a:t>A = Q</a:t>
+              <a:t> </a:t>
+            </a:r>
+            <a:r>
+              <a:rPr lang="en-US" sz="3000" i="1" spc="300" dirty="0" smtClean="0">
+                <a:latin typeface="+mn-lt"/>
+                <a:cs typeface="PFDinTextCompPro-Italic"/>
+              </a:rPr>
+              <a:t>= Q</a:t>
             </a:r>
             <a:r>
               <a:rPr lang="en-US" sz="3200" i="1" spc="300" dirty="0" smtClean="0">
@@ -25249,27 +25302,48 @@
               <a:t> of a square matrix </a:t>
             </a:r>
             <a:r>
-              <a:rPr lang="en-US" sz="2500" i="1" dirty="0" smtClean="0">
+              <a:rPr lang="en-US" sz="2500" i="1" dirty="0">
                 <a:latin typeface="+mn-lt"/>
                 <a:cs typeface="PFDinTextCompPro-Italic"/>
               </a:rPr>
-              <a:t>A</a:t>
-            </a:r>
-            <a:r>
-              <a:rPr lang="en-US" sz="3000" dirty="0" smtClean="0">
-                <a:latin typeface="PFDinTextCompPro-Italic"/>
-                <a:cs typeface="PFDinTextCompPro-Italic"/>
-              </a:rPr>
-              <a:t> is given by:</a:t>
-            </a:r>
-          </a:p>
-          <a:p>
+              <a:t>C</a:t>
+            </a:r>
+            <a:r>
+              <a:rPr lang="en-US" sz="3000" dirty="0" smtClean="0">
+                <a:latin typeface="PFDinTextCompPro-Italic"/>
+                <a:cs typeface="PFDinTextCompPro-Italic"/>
+              </a:rPr>
+              <a:t> </a:t>
+            </a:r>
+            <a:r>
+              <a:rPr lang="en-US" sz="3000" dirty="0" smtClean="0">
+                <a:latin typeface="PFDinTextCompPro-Italic"/>
+                <a:cs typeface="PFDinTextCompPro-Italic"/>
+              </a:rPr>
+              <a:t>is given by:</a:t>
+            </a:r>
+          </a:p>
+          <a:p>
+            <a:r>
+              <a:rPr lang="en-US" sz="3000" i="1" spc="300" dirty="0">
+                <a:latin typeface="+mn-lt"/>
+                <a:cs typeface="PFDinTextCompPro-Italic"/>
+              </a:rPr>
+              <a:t>C</a:t>
+            </a:r>
             <a:r>
               <a:rPr lang="en-US" sz="3000" i="1" spc="300" dirty="0" smtClean="0">
                 <a:latin typeface="+mn-lt"/>
                 <a:cs typeface="PFDinTextCompPro-Italic"/>
               </a:rPr>
-              <a:t>A = Q</a:t>
+              <a:t> </a:t>
+            </a:r>
+            <a:r>
+              <a:rPr lang="en-US" sz="3000" i="1" spc="300" dirty="0" smtClean="0">
+                <a:latin typeface="+mn-lt"/>
+                <a:cs typeface="PFDinTextCompPro-Italic"/>
+              </a:rPr>
+              <a:t>= Q</a:t>
             </a:r>
             <a:r>
               <a:rPr lang="en-US" sz="3200" i="1" spc="300" dirty="0" smtClean="0">
@@ -25338,18 +25412,25 @@
               <a:t> of </a:t>
             </a:r>
             <a:r>
-              <a:rPr lang="en-US" sz="2500" i="1" dirty="0" smtClean="0">
+              <a:rPr lang="en-US" sz="2500" i="1" dirty="0">
                 <a:latin typeface="+mn-lt"/>
                 <a:cs typeface="PFDinTextCompPro-Italic"/>
               </a:rPr>
-              <a:t>A</a:t>
-            </a:r>
-            <a:r>
-              <a:rPr lang="en-US" sz="3000" dirty="0" smtClean="0">
-                <a:latin typeface="PFDinTextCompPro-Italic"/>
-                <a:cs typeface="PFDinTextCompPro-Italic"/>
-              </a:rPr>
-              <a:t>, and the values in </a:t>
+              <a:t>C</a:t>
+            </a:r>
+            <a:r>
+              <a:rPr lang="en-US" sz="3000" dirty="0" smtClean="0">
+                <a:latin typeface="PFDinTextCompPro-Italic"/>
+                <a:cs typeface="PFDinTextCompPro-Italic"/>
+              </a:rPr>
+              <a:t>, </a:t>
+            </a:r>
+            <a:r>
+              <a:rPr lang="en-US" sz="3000" dirty="0" smtClean="0">
+                <a:latin typeface="PFDinTextCompPro-Italic"/>
+                <a:cs typeface="PFDinTextCompPro-Italic"/>
+              </a:rPr>
+              <a:t>and the values in </a:t>
             </a:r>
             <a:r>
               <a:rPr lang="en-US" sz="2800" i="1" dirty="0" smtClean="0">
@@ -25380,11 +25461,11 @@
               <a:t> of </a:t>
             </a:r>
             <a:r>
-              <a:rPr lang="en-US" sz="2500" i="1" dirty="0" smtClean="0">
+              <a:rPr lang="en-US" sz="2500" i="1" dirty="0">
                 <a:latin typeface="+mn-lt"/>
                 <a:cs typeface="PFDinTextCompPro-Italic"/>
               </a:rPr>
-              <a:t>A</a:t>
+              <a:t>C</a:t>
             </a:r>
             <a:r>
               <a:rPr lang="en-US" sz="3000" dirty="0" smtClean="0">
@@ -25393,6 +25474,10 @@
               </a:rPr>
               <a:t>.</a:t>
             </a:r>
+            <a:endParaRPr lang="en-US" sz="3000" dirty="0" smtClean="0">
+              <a:latin typeface="PFDinTextCompPro-Italic"/>
+              <a:cs typeface="PFDinTextCompPro-Italic"/>
+            </a:endParaRPr>
           </a:p>
         </p:txBody>
       </p:sp>
@@ -25542,27 +25627,48 @@
               <a:t> of a square matrix </a:t>
             </a:r>
             <a:r>
-              <a:rPr lang="en-US" sz="2500" i="1" dirty="0" smtClean="0">
+              <a:rPr lang="en-US" sz="2500" i="1" dirty="0">
                 <a:latin typeface="+mn-lt"/>
                 <a:cs typeface="PFDinTextCompPro-Italic"/>
               </a:rPr>
-              <a:t>A</a:t>
-            </a:r>
-            <a:r>
-              <a:rPr lang="en-US" sz="3000" dirty="0" smtClean="0">
-                <a:latin typeface="PFDinTextCompPro-Italic"/>
-                <a:cs typeface="PFDinTextCompPro-Italic"/>
-              </a:rPr>
-              <a:t> is given by:</a:t>
-            </a:r>
-          </a:p>
-          <a:p>
+              <a:t>C</a:t>
+            </a:r>
+            <a:r>
+              <a:rPr lang="en-US" sz="3000" dirty="0" smtClean="0">
+                <a:latin typeface="PFDinTextCompPro-Italic"/>
+                <a:cs typeface="PFDinTextCompPro-Italic"/>
+              </a:rPr>
+              <a:t> </a:t>
+            </a:r>
+            <a:r>
+              <a:rPr lang="en-US" sz="3000" dirty="0" smtClean="0">
+                <a:latin typeface="PFDinTextCompPro-Italic"/>
+                <a:cs typeface="PFDinTextCompPro-Italic"/>
+              </a:rPr>
+              <a:t>is given by:</a:t>
+            </a:r>
+          </a:p>
+          <a:p>
+            <a:r>
+              <a:rPr lang="en-US" sz="3000" i="1" spc="300" dirty="0">
+                <a:latin typeface="+mn-lt"/>
+                <a:cs typeface="PFDinTextCompPro-Italic"/>
+              </a:rPr>
+              <a:t>C</a:t>
+            </a:r>
             <a:r>
               <a:rPr lang="en-US" sz="3000" i="1" spc="300" dirty="0" smtClean="0">
                 <a:latin typeface="+mn-lt"/>
                 <a:cs typeface="PFDinTextCompPro-Italic"/>
               </a:rPr>
-              <a:t>A = Q</a:t>
+              <a:t> </a:t>
+            </a:r>
+            <a:r>
+              <a:rPr lang="en-US" sz="3000" i="1" spc="300" dirty="0" smtClean="0">
+                <a:latin typeface="+mn-lt"/>
+                <a:cs typeface="PFDinTextCompPro-Italic"/>
+              </a:rPr>
+              <a:t>= Q</a:t>
             </a:r>
             <a:r>
               <a:rPr lang="en-US" sz="3200" i="1" spc="300" dirty="0" smtClean="0">
@@ -25635,14 +25741,21 @@
                 <a:latin typeface="+mn-lt"/>
                 <a:cs typeface="PFDinTextCompPro-Italic"/>
               </a:rPr>
-              <a:t>A</a:t>
-            </a:r>
-            <a:r>
-              <a:rPr lang="en-US" sz="3000" dirty="0" smtClean="0">
-                <a:latin typeface="PFDinTextCompPro-Italic"/>
-                <a:cs typeface="PFDinTextCompPro-Italic"/>
-              </a:rPr>
-              <a:t>, and the values in </a:t>
+              <a:t>C</a:t>
+            </a:r>
+            <a:r>
+              <a:rPr lang="en-US" sz="3000" dirty="0" smtClean="0">
+                <a:latin typeface="PFDinTextCompPro-Italic"/>
+                <a:cs typeface="PFDinTextCompPro-Italic"/>
+              </a:rPr>
+              <a:t>, </a:t>
+            </a:r>
+            <a:r>
+              <a:rPr lang="en-US" sz="3000" dirty="0" smtClean="0">
+                <a:latin typeface="PFDinTextCompPro-Italic"/>
+                <a:cs typeface="PFDinTextCompPro-Italic"/>
+              </a:rPr>
+              <a:t>and the values in </a:t>
             </a:r>
             <a:r>
               <a:rPr lang="en-US" sz="2800" i="1" dirty="0" smtClean="0">
@@ -25673,11 +25786,11 @@
               <a:t> of </a:t>
             </a:r>
             <a:r>
-              <a:rPr lang="en-US" sz="2500" i="1" dirty="0" smtClean="0">
+              <a:rPr lang="en-US" sz="2500" i="1" dirty="0">
                 <a:latin typeface="+mn-lt"/>
                 <a:cs typeface="PFDinTextCompPro-Italic"/>
               </a:rPr>
-              <a:t>A</a:t>
+              <a:t>C</a:t>
             </a:r>
             <a:r>
               <a:rPr lang="en-US" sz="3000" dirty="0" smtClean="0">
@@ -25686,6 +25799,10 @@
               </a:rPr>
               <a:t>.</a:t>
             </a:r>
+            <a:endParaRPr lang="en-US" sz="3000" dirty="0" smtClean="0">
+              <a:latin typeface="PFDinTextCompPro-Italic"/>
+              <a:cs typeface="PFDinTextCompPro-Italic"/>
+            </a:endParaRPr>
           </a:p>
           <a:p>
             <a:pPr algn="l"/>
@@ -25718,18 +25835,25 @@
               <a:t> of </a:t>
             </a:r>
             <a:r>
-              <a:rPr lang="en-US" sz="2500" i="1" dirty="0" smtClean="0">
+              <a:rPr lang="en-US" sz="2500" i="1" dirty="0">
                 <a:latin typeface="+mn-lt"/>
                 <a:cs typeface="PFDinTextCompPro-Italic"/>
               </a:rPr>
-              <a:t>A</a:t>
-            </a:r>
-            <a:r>
-              <a:rPr lang="en-US" sz="3000" dirty="0" smtClean="0">
-                <a:latin typeface="PFDinTextCompPro-Italic"/>
-                <a:cs typeface="PFDinTextCompPro-Italic"/>
-              </a:rPr>
-              <a:t> and its eigenvalue </a:t>
+              <a:t>C</a:t>
+            </a:r>
+            <a:r>
+              <a:rPr lang="en-US" sz="3000" dirty="0" smtClean="0">
+                <a:latin typeface="PFDinTextCompPro-Italic"/>
+                <a:cs typeface="PFDinTextCompPro-Italic"/>
+              </a:rPr>
+              <a:t> </a:t>
+            </a:r>
+            <a:r>
+              <a:rPr lang="en-US" sz="3000" dirty="0" smtClean="0">
+                <a:latin typeface="PFDinTextCompPro-Italic"/>
+                <a:cs typeface="PFDinTextCompPro-Italic"/>
+              </a:rPr>
+              <a:t>and its eigenvalue </a:t>
             </a:r>
             <a:r>
               <a:rPr lang="en-US" sz="2800" i="1" dirty="0" smtClean="0">
@@ -25748,11 +25872,32 @@
           </a:p>
           <a:p>
             <a:r>
+              <a:rPr lang="en-US" sz="2500" i="1" dirty="0" err="1">
+                <a:latin typeface="+mn-lt"/>
+                <a:cs typeface="PFDinTextCompPro-Italic"/>
+              </a:rPr>
+              <a:t>C</a:t>
+            </a:r>
+            <a:r>
+              <a:rPr lang="en-US" sz="2500" i="1" dirty="0" err="1" smtClean="0">
+                <a:latin typeface="+mn-lt"/>
+                <a:cs typeface="PFDinTextCompPro-Italic"/>
+              </a:rPr>
+              <a:t>v</a:t>
+            </a:r>
+            <a:r>
               <a:rPr lang="en-US" sz="2500" i="1" dirty="0" smtClean="0">
                 <a:latin typeface="+mn-lt"/>
                 <a:cs typeface="PFDinTextCompPro-Italic"/>
               </a:rPr>
-              <a:t>Av = </a:t>
+              <a:t> </a:t>
+            </a:r>
+            <a:r>
+              <a:rPr lang="en-US" sz="2500" i="1" dirty="0" smtClean="0">
+                <a:latin typeface="+mn-lt"/>
+                <a:cs typeface="PFDinTextCompPro-Italic"/>
+              </a:rPr>
+              <a:t>= </a:t>
             </a:r>
             <a:r>
               <a:rPr lang="en-US" sz="2500" i="1" dirty="0" smtClean="0">
@@ -25921,27 +26066,48 @@
               <a:t> of a square matrix </a:t>
             </a:r>
             <a:r>
-              <a:rPr lang="en-US" sz="2500" i="1" dirty="0" smtClean="0">
+              <a:rPr lang="en-US" sz="2500" i="1" dirty="0">
                 <a:latin typeface="+mn-lt"/>
                 <a:cs typeface="PFDinTextCompPro-Italic"/>
               </a:rPr>
-              <a:t>A</a:t>
-            </a:r>
-            <a:r>
-              <a:rPr lang="en-US" sz="3000" dirty="0" smtClean="0">
-                <a:latin typeface="PFDinTextCompPro-Italic"/>
-                <a:cs typeface="PFDinTextCompPro-Italic"/>
-              </a:rPr>
-              <a:t> is given by:</a:t>
-            </a:r>
-          </a:p>
-          <a:p>
+              <a:t>C</a:t>
+            </a:r>
+            <a:r>
+              <a:rPr lang="en-US" sz="3000" dirty="0" smtClean="0">
+                <a:latin typeface="PFDinTextCompPro-Italic"/>
+                <a:cs typeface="PFDinTextCompPro-Italic"/>
+              </a:rPr>
+              <a:t> </a:t>
+            </a:r>
+            <a:r>
+              <a:rPr lang="en-US" sz="3000" dirty="0" smtClean="0">
+                <a:latin typeface="PFDinTextCompPro-Italic"/>
+                <a:cs typeface="PFDinTextCompPro-Italic"/>
+              </a:rPr>
+              <a:t>is given by:</a:t>
+            </a:r>
+          </a:p>
+          <a:p>
+            <a:r>
+              <a:rPr lang="en-US" sz="3000" i="1" spc="300" dirty="0">
+                <a:latin typeface="+mn-lt"/>
+                <a:cs typeface="PFDinTextCompPro-Italic"/>
+              </a:rPr>
+              <a:t>C</a:t>
+            </a:r>
             <a:r>
               <a:rPr lang="en-US" sz="3000" i="1" spc="300" dirty="0" smtClean="0">
                 <a:latin typeface="+mn-lt"/>
                 <a:cs typeface="PFDinTextCompPro-Italic"/>
               </a:rPr>
-              <a:t>A = Q</a:t>
+              <a:t> </a:t>
+            </a:r>
+            <a:r>
+              <a:rPr lang="en-US" sz="3000" i="1" spc="300" dirty="0" smtClean="0">
+                <a:latin typeface="+mn-lt"/>
+                <a:cs typeface="PFDinTextCompPro-Italic"/>
+              </a:rPr>
+              <a:t>= Q</a:t>
             </a:r>
             <a:r>
               <a:rPr lang="en-US" sz="3200" i="1" spc="300" dirty="0" smtClean="0">
@@ -26010,18 +26176,25 @@
               <a:t> of </a:t>
             </a:r>
             <a:r>
-              <a:rPr lang="en-US" sz="2500" i="1" dirty="0" smtClean="0">
+              <a:rPr lang="en-US" sz="2500" i="1" dirty="0">
                 <a:latin typeface="+mn-lt"/>
                 <a:cs typeface="PFDinTextCompPro-Italic"/>
               </a:rPr>
-              <a:t>A</a:t>
-            </a:r>
-            <a:r>
-              <a:rPr lang="en-US" sz="3000" dirty="0" smtClean="0">
-                <a:latin typeface="PFDinTextCompPro-Italic"/>
-                <a:cs typeface="PFDinTextCompPro-Italic"/>
-              </a:rPr>
-              <a:t>, and the values in </a:t>
+              <a:t>C</a:t>
+            </a:r>
+            <a:r>
+              <a:rPr lang="en-US" sz="3000" dirty="0" smtClean="0">
+                <a:latin typeface="PFDinTextCompPro-Italic"/>
+                <a:cs typeface="PFDinTextCompPro-Italic"/>
+              </a:rPr>
+              <a:t>, </a:t>
+            </a:r>
+            <a:r>
+              <a:rPr lang="en-US" sz="3000" dirty="0" smtClean="0">
+                <a:latin typeface="PFDinTextCompPro-Italic"/>
+                <a:cs typeface="PFDinTextCompPro-Italic"/>
+              </a:rPr>
+              <a:t>and the values in </a:t>
             </a:r>
             <a:r>
               <a:rPr lang="en-US" sz="2800" i="1" dirty="0" smtClean="0">
@@ -26052,11 +26225,11 @@
               <a:t> of </a:t>
             </a:r>
             <a:r>
-              <a:rPr lang="en-US" sz="2500" i="1" dirty="0" smtClean="0">
+              <a:rPr lang="en-US" sz="2500" i="1" dirty="0">
                 <a:latin typeface="+mn-lt"/>
                 <a:cs typeface="PFDinTextCompPro-Italic"/>
               </a:rPr>
-              <a:t>A</a:t>
+              <a:t>C</a:t>
             </a:r>
             <a:r>
               <a:rPr lang="en-US" sz="3000" dirty="0" smtClean="0">
@@ -26065,6 +26238,10 @@
               </a:rPr>
               <a:t>.</a:t>
             </a:r>
+            <a:endParaRPr lang="en-US" sz="3000" dirty="0" smtClean="0">
+              <a:latin typeface="PFDinTextCompPro-Italic"/>
+              <a:cs typeface="PFDinTextCompPro-Italic"/>
+            </a:endParaRPr>
           </a:p>
           <a:p>
             <a:pPr algn="l"/>
@@ -26097,18 +26274,25 @@
               <a:t> of </a:t>
             </a:r>
             <a:r>
-              <a:rPr lang="en-US" sz="2500" i="1" dirty="0" smtClean="0">
+              <a:rPr lang="en-US" sz="2500" i="1" dirty="0">
                 <a:latin typeface="+mn-lt"/>
                 <a:cs typeface="PFDinTextCompPro-Italic"/>
               </a:rPr>
-              <a:t>A</a:t>
-            </a:r>
-            <a:r>
-              <a:rPr lang="en-US" sz="3000" dirty="0" smtClean="0">
-                <a:latin typeface="PFDinTextCompPro-Italic"/>
-                <a:cs typeface="PFDinTextCompPro-Italic"/>
-              </a:rPr>
-              <a:t> and its eigenvalue </a:t>
+              <a:t>C</a:t>
+            </a:r>
+            <a:r>
+              <a:rPr lang="en-US" sz="3000" dirty="0" smtClean="0">
+                <a:latin typeface="PFDinTextCompPro-Italic"/>
+                <a:cs typeface="PFDinTextCompPro-Italic"/>
+              </a:rPr>
+              <a:t> </a:t>
+            </a:r>
+            <a:r>
+              <a:rPr lang="en-US" sz="3000" dirty="0" smtClean="0">
+                <a:latin typeface="PFDinTextCompPro-Italic"/>
+                <a:cs typeface="PFDinTextCompPro-Italic"/>
+              </a:rPr>
+              <a:t>and its eigenvalue </a:t>
             </a:r>
             <a:r>
               <a:rPr lang="en-US" sz="2800" i="1" dirty="0" smtClean="0">
@@ -26127,11 +26311,32 @@
           </a:p>
           <a:p>
             <a:r>
+              <a:rPr lang="en-US" sz="2500" i="1" dirty="0" err="1">
+                <a:latin typeface="+mn-lt"/>
+                <a:cs typeface="PFDinTextCompPro-Italic"/>
+              </a:rPr>
+              <a:t>C</a:t>
+            </a:r>
+            <a:r>
+              <a:rPr lang="en-US" sz="2500" i="1" dirty="0" err="1" smtClean="0">
+                <a:latin typeface="+mn-lt"/>
+                <a:cs typeface="PFDinTextCompPro-Italic"/>
+              </a:rPr>
+              <a:t>v</a:t>
+            </a:r>
+            <a:r>
               <a:rPr lang="en-US" sz="2500" i="1" dirty="0" smtClean="0">
                 <a:latin typeface="+mn-lt"/>
                 <a:cs typeface="PFDinTextCompPro-Italic"/>
               </a:rPr>
-              <a:t>Av = </a:t>
+              <a:t> </a:t>
+            </a:r>
+            <a:r>
+              <a:rPr lang="en-US" sz="2500" i="1" dirty="0" smtClean="0">
+                <a:latin typeface="+mn-lt"/>
+                <a:cs typeface="PFDinTextCompPro-Italic"/>
+              </a:rPr>
+              <a:t>= </a:t>
             </a:r>
             <a:r>
               <a:rPr lang="en-US" sz="2500" i="1" dirty="0" smtClean="0">
@@ -26383,7 +26588,7 @@
                 <a:t> what it means to be an eigenvector of </a:t>
               </a:r>
               <a:r>
-                <a:rPr lang="en-US" sz="900" i="1" dirty="0" smtClean="0">
+                <a:rPr lang="en-US" sz="900" i="1" dirty="0">
                   <a:solidFill>
                     <a:schemeClr val="tx1"/>
                   </a:solidFill>
@@ -26392,7 +26597,7 @@
                   <a:cs typeface="PFDinTextCompPro-Italic"/>
                   <a:sym typeface="News706 BT" charset="0"/>
                 </a:rPr>
-                <a:t>A</a:t>
+                <a:t>C</a:t>
               </a:r>
               <a:r>
                 <a:rPr lang="en-US" sz="900" dirty="0" smtClean="0">
@@ -26406,6 +26611,15 @@
                 </a:rPr>
                 <a:t>.</a:t>
               </a:r>
+              <a:endParaRPr lang="en-US" sz="900" dirty="0" smtClean="0">
+                <a:solidFill>
+                  <a:schemeClr val="tx1"/>
+                </a:solidFill>
+                <a:latin typeface="+mn-lt"/>
+                <a:ea typeface="ＭＳ Ｐゴシック" charset="0"/>
+                <a:cs typeface="PFDinTextCompPro-Italic"/>
+                <a:sym typeface="News706 BT" charset="0"/>
+              </a:endParaRPr>
             </a:p>
           </p:txBody>
         </p:sp>
@@ -26546,14 +26760,21 @@
                 <a:latin typeface="+mn-lt"/>
                 <a:cs typeface="PFDinTextCompPro-Italic"/>
               </a:rPr>
-              <a:t>A</a:t>
+              <a:t>C</a:t>
+            </a:r>
+            <a:r>
+              <a:rPr lang="en-US" sz="3000" dirty="0" smtClean="0">
+                <a:latin typeface="PFDinTextCompPro-Italic"/>
+                <a:cs typeface="PFDinTextCompPro-Italic"/>
+              </a:rPr>
+              <a:t> </a:t>
             </a:r>
             <a:r>
               <a:rPr lang="en-US" sz="3000" dirty="0">
                 <a:latin typeface="PFDinTextCompPro-Italic"/>
                 <a:cs typeface="PFDinTextCompPro-Italic"/>
               </a:rPr>
-              <a:t> acts (</a:t>
+              <a:t>acts (</a:t>
             </a:r>
             <a:r>
               <a:rPr lang="en-US" sz="3000" dirty="0" err="1">
@@ -26719,14 +26940,21 @@
                 <a:latin typeface="+mn-lt"/>
                 <a:cs typeface="PFDinTextCompPro-Italic"/>
               </a:rPr>
-              <a:t>A</a:t>
+              <a:t>C</a:t>
+            </a:r>
+            <a:r>
+              <a:rPr lang="en-US" sz="3000" dirty="0" smtClean="0">
+                <a:latin typeface="PFDinTextCompPro-Italic"/>
+                <a:cs typeface="PFDinTextCompPro-Italic"/>
+              </a:rPr>
+              <a:t> </a:t>
             </a:r>
             <a:r>
               <a:rPr lang="en-US" sz="3000" dirty="0">
                 <a:latin typeface="PFDinTextCompPro-Italic"/>
                 <a:cs typeface="PFDinTextCompPro-Italic"/>
               </a:rPr>
-              <a:t> acts (</a:t>
+              <a:t>acts (</a:t>
             </a:r>
             <a:r>
               <a:rPr lang="en-US" sz="3000" dirty="0" err="1">
@@ -26898,14 +27126,21 @@
                 <a:latin typeface="+mn-lt"/>
                 <a:cs typeface="PFDinTextCompPro-Italic"/>
               </a:rPr>
-              <a:t>A</a:t>
+              <a:t>C</a:t>
+            </a:r>
+            <a:r>
+              <a:rPr lang="en-US" sz="3000" dirty="0" smtClean="0">
+                <a:latin typeface="PFDinTextCompPro-Italic"/>
+                <a:cs typeface="PFDinTextCompPro-Italic"/>
+              </a:rPr>
+              <a:t> </a:t>
             </a:r>
             <a:r>
               <a:rPr lang="en-US" sz="3000" dirty="0">
                 <a:latin typeface="PFDinTextCompPro-Italic"/>
                 <a:cs typeface="PFDinTextCompPro-Italic"/>
               </a:rPr>
-              <a:t> acts (</a:t>
+              <a:t>acts (</a:t>
             </a:r>
             <a:r>
               <a:rPr lang="en-US" sz="3000" dirty="0" err="1">
@@ -27896,18 +28131,25 @@
               <a:t>Consider a matrix </a:t>
             </a:r>
             <a:r>
-              <a:rPr lang="en-US" sz="2500" i="1" dirty="0" smtClean="0">
+              <a:rPr lang="en-US" sz="2500" i="1" dirty="0">
                 <a:latin typeface="+mn-lt"/>
                 <a:cs typeface="PFDinTextCompPro-Italic"/>
               </a:rPr>
-              <a:t>A</a:t>
-            </a:r>
-            <a:r>
-              <a:rPr lang="en-US" sz="3000" dirty="0" smtClean="0">
-                <a:latin typeface="PFDinTextCompPro-Italic"/>
-                <a:cs typeface="PFDinTextCompPro-Italic"/>
-              </a:rPr>
-              <a:t> with </a:t>
+              <a:t>X</a:t>
+            </a:r>
+            <a:r>
+              <a:rPr lang="en-US" sz="3000" dirty="0" smtClean="0">
+                <a:latin typeface="PFDinTextCompPro-Italic"/>
+                <a:cs typeface="PFDinTextCompPro-Italic"/>
+              </a:rPr>
+              <a:t> </a:t>
+            </a:r>
+            <a:r>
+              <a:rPr lang="en-US" sz="3000" dirty="0" smtClean="0">
+                <a:latin typeface="PFDinTextCompPro-Italic"/>
+                <a:cs typeface="PFDinTextCompPro-Italic"/>
+              </a:rPr>
+              <a:t>with </a:t>
             </a:r>
             <a:r>
               <a:rPr lang="en-US" sz="2500" i="1" dirty="0" smtClean="0">
@@ -28072,18 +28314,25 @@
               <a:t>Consider a matrix </a:t>
             </a:r>
             <a:r>
-              <a:rPr lang="en-US" sz="2500" i="1" dirty="0" smtClean="0">
+              <a:rPr lang="en-US" sz="2500" i="1" dirty="0">
                 <a:latin typeface="+mn-lt"/>
                 <a:cs typeface="PFDinTextCompPro-Italic"/>
               </a:rPr>
-              <a:t>A</a:t>
-            </a:r>
-            <a:r>
-              <a:rPr lang="en-US" sz="3000" dirty="0" smtClean="0">
-                <a:latin typeface="PFDinTextCompPro-Italic"/>
-                <a:cs typeface="PFDinTextCompPro-Italic"/>
-              </a:rPr>
-              <a:t> with </a:t>
+              <a:t>X</a:t>
+            </a:r>
+            <a:r>
+              <a:rPr lang="en-US" sz="3000" dirty="0" smtClean="0">
+                <a:latin typeface="PFDinTextCompPro-Italic"/>
+                <a:cs typeface="PFDinTextCompPro-Italic"/>
+              </a:rPr>
+              <a:t> </a:t>
+            </a:r>
+            <a:r>
+              <a:rPr lang="en-US" sz="3000" dirty="0" smtClean="0">
+                <a:latin typeface="PFDinTextCompPro-Italic"/>
+                <a:cs typeface="PFDinTextCompPro-Italic"/>
+              </a:rPr>
+              <a:t>with </a:t>
             </a:r>
             <a:r>
               <a:rPr lang="en-US" sz="2500" i="1" dirty="0" smtClean="0">
@@ -28145,27 +28394,48 @@
               <a:t> of </a:t>
             </a:r>
             <a:r>
-              <a:rPr lang="en-US" sz="2500" i="1" dirty="0" smtClean="0">
+              <a:rPr lang="en-US" sz="2500" i="1" dirty="0">
                 <a:latin typeface="+mn-lt"/>
                 <a:cs typeface="PFDinTextCompPro-Italic"/>
               </a:rPr>
-              <a:t>A</a:t>
-            </a:r>
-            <a:r>
-              <a:rPr lang="en-US" sz="3000" dirty="0" smtClean="0">
-                <a:latin typeface="PFDinTextCompPro-Italic"/>
-                <a:cs typeface="PFDinTextCompPro-Italic"/>
-              </a:rPr>
-              <a:t> is given by:</a:t>
-            </a:r>
-          </a:p>
-          <a:p>
+              <a:t>X</a:t>
+            </a:r>
+            <a:r>
+              <a:rPr lang="en-US" sz="3000" dirty="0" smtClean="0">
+                <a:latin typeface="PFDinTextCompPro-Italic"/>
+                <a:cs typeface="PFDinTextCompPro-Italic"/>
+              </a:rPr>
+              <a:t> </a:t>
+            </a:r>
+            <a:r>
+              <a:rPr lang="en-US" sz="3000" dirty="0" smtClean="0">
+                <a:latin typeface="PFDinTextCompPro-Italic"/>
+                <a:cs typeface="PFDinTextCompPro-Italic"/>
+              </a:rPr>
+              <a:t>is given by:</a:t>
+            </a:r>
+          </a:p>
+          <a:p>
+            <a:r>
+              <a:rPr lang="en-US" sz="5000" i="1" spc="600" dirty="0">
+                <a:latin typeface="+mn-lt"/>
+                <a:cs typeface="PFDinTextCompPro-Italic"/>
+              </a:rPr>
+              <a:t>X</a:t>
+            </a:r>
             <a:r>
               <a:rPr lang="en-US" sz="5000" i="1" spc="600" dirty="0" smtClean="0">
                 <a:latin typeface="+mn-lt"/>
                 <a:cs typeface="PFDinTextCompPro-Italic"/>
               </a:rPr>
-              <a:t>A = U </a:t>
+              <a:t> </a:t>
+            </a:r>
+            <a:r>
+              <a:rPr lang="en-US" sz="5000" i="1" spc="600" dirty="0" smtClean="0">
+                <a:latin typeface="+mn-lt"/>
+                <a:cs typeface="PFDinTextCompPro-Italic"/>
+              </a:rPr>
+              <a:t>= U </a:t>
             </a:r>
             <a:r>
               <a:rPr lang="en-US" sz="5200" i="1" spc="600" dirty="0" smtClean="0">
@@ -28330,18 +28600,25 @@
               <a:t>Consider a matrix </a:t>
             </a:r>
             <a:r>
-              <a:rPr lang="en-US" sz="2500" i="1" dirty="0" smtClean="0">
+              <a:rPr lang="en-US" sz="2500" i="1" dirty="0">
                 <a:latin typeface="+mn-lt"/>
                 <a:cs typeface="PFDinTextCompPro-Italic"/>
               </a:rPr>
-              <a:t>A</a:t>
-            </a:r>
-            <a:r>
-              <a:rPr lang="en-US" sz="3000" dirty="0" smtClean="0">
-                <a:latin typeface="PFDinTextCompPro-Italic"/>
-                <a:cs typeface="PFDinTextCompPro-Italic"/>
-              </a:rPr>
-              <a:t> with </a:t>
+              <a:t>X</a:t>
+            </a:r>
+            <a:r>
+              <a:rPr lang="en-US" sz="3000" dirty="0" smtClean="0">
+                <a:latin typeface="PFDinTextCompPro-Italic"/>
+                <a:cs typeface="PFDinTextCompPro-Italic"/>
+              </a:rPr>
+              <a:t> </a:t>
+            </a:r>
+            <a:r>
+              <a:rPr lang="en-US" sz="3000" dirty="0" smtClean="0">
+                <a:latin typeface="PFDinTextCompPro-Italic"/>
+                <a:cs typeface="PFDinTextCompPro-Italic"/>
+              </a:rPr>
+              <a:t>with </a:t>
             </a:r>
             <a:r>
               <a:rPr lang="en-US" sz="2500" i="1" dirty="0" smtClean="0">
@@ -28403,27 +28680,48 @@
               <a:t> of </a:t>
             </a:r>
             <a:r>
-              <a:rPr lang="en-US" sz="2500" i="1" dirty="0" smtClean="0">
+              <a:rPr lang="en-US" sz="2500" i="1" dirty="0">
                 <a:latin typeface="+mn-lt"/>
                 <a:cs typeface="PFDinTextCompPro-Italic"/>
               </a:rPr>
-              <a:t>A</a:t>
-            </a:r>
-            <a:r>
-              <a:rPr lang="en-US" sz="3000" dirty="0" smtClean="0">
-                <a:latin typeface="PFDinTextCompPro-Italic"/>
-                <a:cs typeface="PFDinTextCompPro-Italic"/>
-              </a:rPr>
-              <a:t> is given by:</a:t>
-            </a:r>
-          </a:p>
-          <a:p>
+              <a:t>X</a:t>
+            </a:r>
+            <a:r>
+              <a:rPr lang="en-US" sz="3000" dirty="0" smtClean="0">
+                <a:latin typeface="PFDinTextCompPro-Italic"/>
+                <a:cs typeface="PFDinTextCompPro-Italic"/>
+              </a:rPr>
+              <a:t> </a:t>
+            </a:r>
+            <a:r>
+              <a:rPr lang="en-US" sz="3000" dirty="0" smtClean="0">
+                <a:latin typeface="PFDinTextCompPro-Italic"/>
+                <a:cs typeface="PFDinTextCompPro-Italic"/>
+              </a:rPr>
+              <a:t>is given by:</a:t>
+            </a:r>
+          </a:p>
+          <a:p>
+            <a:r>
+              <a:rPr lang="en-US" sz="5000" i="1" spc="600" dirty="0">
+                <a:latin typeface="+mn-lt"/>
+                <a:cs typeface="PFDinTextCompPro-Italic"/>
+              </a:rPr>
+              <a:t>X</a:t>
+            </a:r>
             <a:r>
               <a:rPr lang="en-US" sz="5000" i="1" spc="600" dirty="0" smtClean="0">
                 <a:latin typeface="+mn-lt"/>
                 <a:cs typeface="PFDinTextCompPro-Italic"/>
               </a:rPr>
-              <a:t>A = U </a:t>
+              <a:t> </a:t>
+            </a:r>
+            <a:r>
+              <a:rPr lang="en-US" sz="5000" i="1" spc="600" dirty="0" smtClean="0">
+                <a:latin typeface="+mn-lt"/>
+                <a:cs typeface="PFDinTextCompPro-Italic"/>
+              </a:rPr>
+              <a:t>= U </a:t>
             </a:r>
             <a:r>
               <a:rPr lang="en-US" sz="5200" i="1" spc="600" dirty="0" smtClean="0">
@@ -28612,18 +28910,25 @@
               <a:t>Consider a matrix </a:t>
             </a:r>
             <a:r>
-              <a:rPr lang="en-US" sz="2500" i="1" dirty="0" smtClean="0">
+              <a:rPr lang="en-US" sz="2500" i="1" dirty="0">
                 <a:latin typeface="+mn-lt"/>
                 <a:cs typeface="PFDinTextCompPro-Italic"/>
               </a:rPr>
-              <a:t>A</a:t>
-            </a:r>
-            <a:r>
-              <a:rPr lang="en-US" sz="3000" dirty="0" smtClean="0">
-                <a:latin typeface="PFDinTextCompPro-Italic"/>
-                <a:cs typeface="PFDinTextCompPro-Italic"/>
-              </a:rPr>
-              <a:t> with </a:t>
+              <a:t>X</a:t>
+            </a:r>
+            <a:r>
+              <a:rPr lang="en-US" sz="3000" dirty="0" smtClean="0">
+                <a:latin typeface="PFDinTextCompPro-Italic"/>
+                <a:cs typeface="PFDinTextCompPro-Italic"/>
+              </a:rPr>
+              <a:t> </a:t>
+            </a:r>
+            <a:r>
+              <a:rPr lang="en-US" sz="3000" dirty="0" smtClean="0">
+                <a:latin typeface="PFDinTextCompPro-Italic"/>
+                <a:cs typeface="PFDinTextCompPro-Italic"/>
+              </a:rPr>
+              <a:t>with </a:t>
             </a:r>
             <a:r>
               <a:rPr lang="en-US" sz="2500" i="1" dirty="0" smtClean="0">
@@ -28701,11 +29006,25 @@
           </a:p>
           <a:p>
             <a:r>
+              <a:rPr lang="en-US" sz="5000" i="1" spc="600" dirty="0">
+                <a:latin typeface="+mn-lt"/>
+                <a:cs typeface="PFDinTextCompPro-Italic"/>
+              </a:rPr>
+              <a:t>X</a:t>
+            </a:r>
+            <a:r>
               <a:rPr lang="en-US" sz="5000" i="1" spc="600" dirty="0" smtClean="0">
                 <a:latin typeface="+mn-lt"/>
                 <a:cs typeface="PFDinTextCompPro-Italic"/>
               </a:rPr>
-              <a:t>A = U </a:t>
+              <a:t> </a:t>
+            </a:r>
+            <a:r>
+              <a:rPr lang="en-US" sz="5000" i="1" spc="600" dirty="0" smtClean="0">
+                <a:latin typeface="+mn-lt"/>
+                <a:cs typeface="PFDinTextCompPro-Italic"/>
+              </a:rPr>
+              <a:t>= U </a:t>
             </a:r>
             <a:r>
               <a:rPr lang="en-US" sz="5200" i="1" spc="600" dirty="0" smtClean="0">
@@ -28988,18 +29307,25 @@
               <a:t>Consider a matrix </a:t>
             </a:r>
             <a:r>
-              <a:rPr lang="en-US" sz="2500" i="1" dirty="0" smtClean="0">
+              <a:rPr lang="en-US" sz="2500" i="1" dirty="0">
                 <a:latin typeface="+mn-lt"/>
                 <a:cs typeface="PFDinTextCompPro-Italic"/>
               </a:rPr>
-              <a:t>A</a:t>
-            </a:r>
-            <a:r>
-              <a:rPr lang="en-US" sz="3000" dirty="0" smtClean="0">
-                <a:latin typeface="PFDinTextCompPro-Italic"/>
-                <a:cs typeface="PFDinTextCompPro-Italic"/>
-              </a:rPr>
-              <a:t> with </a:t>
+              <a:t>X</a:t>
+            </a:r>
+            <a:r>
+              <a:rPr lang="en-US" sz="3000" dirty="0" smtClean="0">
+                <a:latin typeface="PFDinTextCompPro-Italic"/>
+                <a:cs typeface="PFDinTextCompPro-Italic"/>
+              </a:rPr>
+              <a:t> </a:t>
+            </a:r>
+            <a:r>
+              <a:rPr lang="en-US" sz="3000" dirty="0" smtClean="0">
+                <a:latin typeface="PFDinTextCompPro-Italic"/>
+                <a:cs typeface="PFDinTextCompPro-Italic"/>
+              </a:rPr>
+              <a:t>with </a:t>
             </a:r>
             <a:r>
               <a:rPr lang="en-US" sz="2500" i="1" dirty="0" smtClean="0">
@@ -29081,7 +29407,21 @@
                 <a:latin typeface="+mn-lt"/>
                 <a:cs typeface="PFDinTextCompPro-Italic"/>
               </a:rPr>
-              <a:t>A = U </a:t>
+              <a:t>X</a:t>
+            </a:r>
+            <a:r>
+              <a:rPr lang="en-US" sz="5000" i="1" spc="600" dirty="0" smtClean="0">
+                <a:latin typeface="+mn-lt"/>
+                <a:cs typeface="PFDinTextCompPro-Italic"/>
+              </a:rPr>
+              <a:t> </a:t>
+            </a:r>
+            <a:r>
+              <a:rPr lang="en-US" sz="5000" i="1" spc="600" dirty="0" smtClean="0">
+                <a:latin typeface="+mn-lt"/>
+                <a:cs typeface="PFDinTextCompPro-Italic"/>
+              </a:rPr>
+              <a:t>= U </a:t>
             </a:r>
             <a:r>
               <a:rPr lang="en-US" sz="5200" i="1" spc="600" dirty="0" smtClean="0">
@@ -29528,27 +29868,48 @@
               <a:t> of </a:t>
             </a:r>
             <a:r>
-              <a:rPr lang="en-US" sz="2500" i="1" dirty="0" smtClean="0">
+              <a:rPr lang="en-US" sz="2500" i="1" dirty="0">
                 <a:latin typeface="+mn-lt"/>
                 <a:cs typeface="PFDinTextCompPro-Italic"/>
               </a:rPr>
-              <a:t>A</a:t>
-            </a:r>
-            <a:r>
-              <a:rPr lang="en-US" sz="3000" dirty="0" smtClean="0">
-                <a:latin typeface="PFDinTextCompPro-Italic"/>
-                <a:cs typeface="PFDinTextCompPro-Italic"/>
-              </a:rPr>
-              <a:t> is given by:</a:t>
-            </a:r>
-          </a:p>
-          <a:p>
+              <a:t>X</a:t>
+            </a:r>
+            <a:r>
+              <a:rPr lang="en-US" sz="3000" dirty="0" smtClean="0">
+                <a:latin typeface="PFDinTextCompPro-Italic"/>
+                <a:cs typeface="PFDinTextCompPro-Italic"/>
+              </a:rPr>
+              <a:t> </a:t>
+            </a:r>
+            <a:r>
+              <a:rPr lang="en-US" sz="3000" dirty="0" smtClean="0">
+                <a:latin typeface="PFDinTextCompPro-Italic"/>
+                <a:cs typeface="PFDinTextCompPro-Italic"/>
+              </a:rPr>
+              <a:t>is given by:</a:t>
+            </a:r>
+          </a:p>
+          <a:p>
+            <a:r>
+              <a:rPr lang="en-US" sz="5000" i="1" spc="600" dirty="0">
+                <a:latin typeface="+mn-lt"/>
+                <a:cs typeface="PFDinTextCompPro-Italic"/>
+              </a:rPr>
+              <a:t>X</a:t>
+            </a:r>
             <a:r>
               <a:rPr lang="en-US" sz="5000" i="1" spc="600" dirty="0" smtClean="0">
                 <a:latin typeface="+mn-lt"/>
                 <a:cs typeface="PFDinTextCompPro-Italic"/>
               </a:rPr>
-              <a:t>A = U </a:t>
+              <a:t> </a:t>
+            </a:r>
+            <a:r>
+              <a:rPr lang="en-US" sz="5000" i="1" spc="600" dirty="0" smtClean="0">
+                <a:latin typeface="+mn-lt"/>
+                <a:cs typeface="PFDinTextCompPro-Italic"/>
+              </a:rPr>
+              <a:t>= U </a:t>
             </a:r>
             <a:r>
               <a:rPr lang="en-US" sz="5200" i="1" spc="600" dirty="0" smtClean="0">
@@ -29677,7 +30038,7 @@
                 <a:latin typeface="+mn-lt"/>
                 <a:cs typeface="PFDinTextCompPro-Italic"/>
               </a:rPr>
-              <a:t>A</a:t>
+              <a:t>X</a:t>
             </a:r>
             <a:r>
               <a:rPr lang="en-US" sz="3000" dirty="0" smtClean="0">
@@ -29839,27 +30200,48 @@
               <a:t> of </a:t>
             </a:r>
             <a:r>
-              <a:rPr lang="en-US" sz="2500" i="1" dirty="0" smtClean="0">
+              <a:rPr lang="en-US" sz="2500" i="1" dirty="0">
                 <a:latin typeface="+mn-lt"/>
                 <a:cs typeface="PFDinTextCompPro-Italic"/>
               </a:rPr>
-              <a:t>A</a:t>
-            </a:r>
-            <a:r>
-              <a:rPr lang="en-US" sz="3000" dirty="0" smtClean="0">
-                <a:latin typeface="PFDinTextCompPro-Italic"/>
-                <a:cs typeface="PFDinTextCompPro-Italic"/>
-              </a:rPr>
-              <a:t> is given by:</a:t>
-            </a:r>
-          </a:p>
-          <a:p>
+              <a:t>X</a:t>
+            </a:r>
+            <a:r>
+              <a:rPr lang="en-US" sz="3000" dirty="0" smtClean="0">
+                <a:latin typeface="PFDinTextCompPro-Italic"/>
+                <a:cs typeface="PFDinTextCompPro-Italic"/>
+              </a:rPr>
+              <a:t> </a:t>
+            </a:r>
+            <a:r>
+              <a:rPr lang="en-US" sz="3000" dirty="0" smtClean="0">
+                <a:latin typeface="PFDinTextCompPro-Italic"/>
+                <a:cs typeface="PFDinTextCompPro-Italic"/>
+              </a:rPr>
+              <a:t>is given by:</a:t>
+            </a:r>
+          </a:p>
+          <a:p>
+            <a:r>
+              <a:rPr lang="en-US" sz="5000" i="1" spc="600" dirty="0">
+                <a:latin typeface="+mn-lt"/>
+                <a:cs typeface="PFDinTextCompPro-Italic"/>
+              </a:rPr>
+              <a:t>X</a:t>
+            </a:r>
             <a:r>
               <a:rPr lang="en-US" sz="5000" i="1" spc="600" dirty="0" smtClean="0">
                 <a:latin typeface="+mn-lt"/>
                 <a:cs typeface="PFDinTextCompPro-Italic"/>
               </a:rPr>
-              <a:t>A = U </a:t>
+              <a:t> </a:t>
+            </a:r>
+            <a:r>
+              <a:rPr lang="en-US" sz="5000" i="1" spc="600" dirty="0" smtClean="0">
+                <a:latin typeface="+mn-lt"/>
+                <a:cs typeface="PFDinTextCompPro-Italic"/>
+              </a:rPr>
+              <a:t>= U </a:t>
             </a:r>
             <a:r>
               <a:rPr lang="en-US" sz="5200" i="1" spc="600" dirty="0" smtClean="0">
@@ -29988,15 +30370,19 @@
                 <a:latin typeface="+mn-lt"/>
                 <a:cs typeface="PFDinTextCompPro-Italic"/>
               </a:rPr>
-              <a:t>A</a:t>
-            </a:r>
-            <a:r>
-              <a:rPr lang="en-US" sz="3000" dirty="0">
+              <a:t>X</a:t>
+            </a:r>
+            <a:r>
+              <a:rPr lang="en-US" sz="3000" dirty="0" smtClean="0">
                 <a:latin typeface="PFDinTextCompPro-Italic"/>
                 <a:cs typeface="PFDinTextCompPro-Italic"/>
               </a:rPr>
               <a:t>.</a:t>
             </a:r>
+            <a:endParaRPr lang="en-US" sz="3000" dirty="0">
+              <a:latin typeface="PFDinTextCompPro-Italic"/>
+              <a:cs typeface="PFDinTextCompPro-Italic"/>
+            </a:endParaRPr>
           </a:p>
           <a:p>
             <a:pPr algn="l"/>
@@ -30293,27 +30679,48 @@
               <a:t> of </a:t>
             </a:r>
             <a:r>
-              <a:rPr lang="en-US" sz="2500" i="1" dirty="0" smtClean="0">
+              <a:rPr lang="en-US" sz="2500" i="1" dirty="0">
                 <a:latin typeface="+mn-lt"/>
                 <a:cs typeface="PFDinTextCompPro-Italic"/>
               </a:rPr>
-              <a:t>A</a:t>
-            </a:r>
-            <a:r>
-              <a:rPr lang="en-US" sz="3000" dirty="0" smtClean="0">
-                <a:latin typeface="PFDinTextCompPro-Italic"/>
-                <a:cs typeface="PFDinTextCompPro-Italic"/>
-              </a:rPr>
-              <a:t> is given by:</a:t>
-            </a:r>
-          </a:p>
-          <a:p>
+              <a:t>X</a:t>
+            </a:r>
+            <a:r>
+              <a:rPr lang="en-US" sz="3000" dirty="0" smtClean="0">
+                <a:latin typeface="PFDinTextCompPro-Italic"/>
+                <a:cs typeface="PFDinTextCompPro-Italic"/>
+              </a:rPr>
+              <a:t> </a:t>
+            </a:r>
+            <a:r>
+              <a:rPr lang="en-US" sz="3000" dirty="0" smtClean="0">
+                <a:latin typeface="PFDinTextCompPro-Italic"/>
+                <a:cs typeface="PFDinTextCompPro-Italic"/>
+              </a:rPr>
+              <a:t>is given by:</a:t>
+            </a:r>
+          </a:p>
+          <a:p>
+            <a:r>
+              <a:rPr lang="en-US" sz="5000" i="1" spc="600" dirty="0">
+                <a:latin typeface="+mn-lt"/>
+                <a:cs typeface="PFDinTextCompPro-Italic"/>
+              </a:rPr>
+              <a:t>X</a:t>
+            </a:r>
             <a:r>
               <a:rPr lang="en-US" sz="5000" i="1" spc="600" dirty="0" smtClean="0">
                 <a:latin typeface="+mn-lt"/>
                 <a:cs typeface="PFDinTextCompPro-Italic"/>
               </a:rPr>
-              <a:t>A = U </a:t>
+              <a:t> </a:t>
+            </a:r>
+            <a:r>
+              <a:rPr lang="en-US" sz="5000" i="1" spc="600" dirty="0" smtClean="0">
+                <a:latin typeface="+mn-lt"/>
+                <a:cs typeface="PFDinTextCompPro-Italic"/>
+              </a:rPr>
+              <a:t>= U </a:t>
             </a:r>
             <a:r>
               <a:rPr lang="en-US" sz="5200" i="1" spc="600" dirty="0" smtClean="0">
@@ -30417,18 +30824,25 @@
               <a:t> of </a:t>
             </a:r>
             <a:r>
-              <a:rPr lang="en-US" sz="2500" i="1" dirty="0" smtClean="0">
+              <a:rPr lang="en-US" sz="2500" i="1" dirty="0">
                 <a:latin typeface="+mn-lt"/>
                 <a:cs typeface="PFDinTextCompPro-Italic"/>
               </a:rPr>
-              <a:t>A</a:t>
-            </a:r>
-            <a:r>
-              <a:rPr lang="en-US" sz="3000" dirty="0" smtClean="0">
-                <a:latin typeface="PFDinTextCompPro-Italic"/>
-                <a:cs typeface="PFDinTextCompPro-Italic"/>
-              </a:rPr>
-              <a:t>. These are real, nonnegative, and </a:t>
+              <a:t>X</a:t>
+            </a:r>
+            <a:r>
+              <a:rPr lang="en-US" sz="3000" dirty="0" smtClean="0">
+                <a:latin typeface="PFDinTextCompPro-Italic"/>
+                <a:cs typeface="PFDinTextCompPro-Italic"/>
+              </a:rPr>
+              <a:t>. </a:t>
+            </a:r>
+            <a:r>
+              <a:rPr lang="en-US" sz="3000" dirty="0" smtClean="0">
+                <a:latin typeface="PFDinTextCompPro-Italic"/>
+                <a:cs typeface="PFDinTextCompPro-Italic"/>
+              </a:rPr>
+              <a:t>These are real, nonnegative, and </a:t>
             </a:r>
             <a:r>
               <a:rPr lang="en-US" sz="3000" i="1" dirty="0" smtClean="0">
@@ -30768,27 +31182,48 @@
               <a:t> of </a:t>
             </a:r>
             <a:r>
-              <a:rPr lang="en-US" sz="2500" i="1" dirty="0" smtClean="0">
+              <a:rPr lang="en-US" sz="2500" i="1" dirty="0">
                 <a:latin typeface="+mn-lt"/>
                 <a:cs typeface="PFDinTextCompPro-Italic"/>
               </a:rPr>
-              <a:t>A</a:t>
-            </a:r>
-            <a:r>
-              <a:rPr lang="en-US" sz="3000" dirty="0" smtClean="0">
-                <a:latin typeface="PFDinTextCompPro-Italic"/>
-                <a:cs typeface="PFDinTextCompPro-Italic"/>
-              </a:rPr>
-              <a:t> is given by:</a:t>
-            </a:r>
-          </a:p>
-          <a:p>
+              <a:t>X</a:t>
+            </a:r>
+            <a:r>
+              <a:rPr lang="en-US" sz="3000" dirty="0" smtClean="0">
+                <a:latin typeface="PFDinTextCompPro-Italic"/>
+                <a:cs typeface="PFDinTextCompPro-Italic"/>
+              </a:rPr>
+              <a:t> </a:t>
+            </a:r>
+            <a:r>
+              <a:rPr lang="en-US" sz="3000" dirty="0" smtClean="0">
+                <a:latin typeface="PFDinTextCompPro-Italic"/>
+                <a:cs typeface="PFDinTextCompPro-Italic"/>
+              </a:rPr>
+              <a:t>is given by:</a:t>
+            </a:r>
+          </a:p>
+          <a:p>
+            <a:r>
+              <a:rPr lang="en-US" sz="5000" i="1" spc="600" dirty="0">
+                <a:latin typeface="+mn-lt"/>
+                <a:cs typeface="PFDinTextCompPro-Italic"/>
+              </a:rPr>
+              <a:t>X</a:t>
+            </a:r>
             <a:r>
               <a:rPr lang="en-US" sz="5000" i="1" spc="600" dirty="0" smtClean="0">
                 <a:latin typeface="+mn-lt"/>
                 <a:cs typeface="PFDinTextCompPro-Italic"/>
               </a:rPr>
-              <a:t>A = U </a:t>
+              <a:t> </a:t>
+            </a:r>
+            <a:r>
+              <a:rPr lang="en-US" sz="5000" i="1" spc="600" dirty="0" smtClean="0">
+                <a:latin typeface="+mn-lt"/>
+                <a:cs typeface="PFDinTextCompPro-Italic"/>
+              </a:rPr>
+              <a:t>= U </a:t>
             </a:r>
             <a:r>
               <a:rPr lang="en-US" sz="5200" i="1" spc="600" dirty="0" smtClean="0">
@@ -30892,18 +31327,25 @@
               <a:t> of </a:t>
             </a:r>
             <a:r>
-              <a:rPr lang="en-US" sz="2500" i="1" dirty="0" smtClean="0">
+              <a:rPr lang="en-US" sz="2500" i="1" dirty="0">
                 <a:latin typeface="+mn-lt"/>
                 <a:cs typeface="PFDinTextCompPro-Italic"/>
               </a:rPr>
-              <a:t>A</a:t>
-            </a:r>
-            <a:r>
-              <a:rPr lang="en-US" sz="3000" dirty="0" smtClean="0">
-                <a:latin typeface="PFDinTextCompPro-Italic"/>
-                <a:cs typeface="PFDinTextCompPro-Italic"/>
-              </a:rPr>
-              <a:t>. These are real, nonnegative, and </a:t>
+              <a:t>X</a:t>
+            </a:r>
+            <a:r>
+              <a:rPr lang="en-US" sz="3000" dirty="0" smtClean="0">
+                <a:latin typeface="PFDinTextCompPro-Italic"/>
+                <a:cs typeface="PFDinTextCompPro-Italic"/>
+              </a:rPr>
+              <a:t>. </a:t>
+            </a:r>
+            <a:r>
+              <a:rPr lang="en-US" sz="3000" dirty="0" smtClean="0">
+                <a:latin typeface="PFDinTextCompPro-Italic"/>
+                <a:cs typeface="PFDinTextCompPro-Italic"/>
+              </a:rPr>
+              <a:t>These are real, nonnegative, and </a:t>
             </a:r>
             <a:r>
               <a:rPr lang="en-US" sz="3000" i="1" dirty="0" smtClean="0">
@@ -31164,8 +31606,29 @@
                   <a:cs typeface="PFDinTextCompPro-Italic"/>
                   <a:sym typeface="News706 BT" charset="0"/>
                 </a:rPr>
-                <a:t> of A.</a:t>
+                <a:t> of </a:t>
               </a:r>
+              <a:r>
+                <a:rPr lang="en-US" sz="900" dirty="0" smtClean="0">
+                  <a:solidFill>
+                    <a:schemeClr val="tx1"/>
+                  </a:solidFill>
+                  <a:latin typeface="+mn-lt"/>
+                  <a:ea typeface="ＭＳ Ｐゴシック" charset="0"/>
+                  <a:cs typeface="PFDinTextCompPro-Italic"/>
+                  <a:sym typeface="News706 BT" charset="0"/>
+                </a:rPr>
+                <a:t>X.</a:t>
+              </a:r>
+              <a:endParaRPr lang="en-US" sz="900" dirty="0" smtClean="0">
+                <a:solidFill>
+                  <a:schemeClr val="tx1"/>
+                </a:solidFill>
+                <a:latin typeface="+mn-lt"/>
+                <a:ea typeface="ＭＳ Ｐゴシック" charset="0"/>
+                <a:cs typeface="PFDinTextCompPro-Italic"/>
+                <a:sym typeface="News706 BT" charset="0"/>
+              </a:endParaRPr>
             </a:p>
             <a:p>
               <a:pPr algn="l">
@@ -31370,60 +31833,60 @@
               <a:t> are the eigenvectors of </a:t>
             </a:r>
             <a:r>
+              <a:rPr lang="en-US" sz="2500" i="1" dirty="0" smtClean="0">
+                <a:latin typeface="+mn-lt"/>
+                <a:cs typeface="PFDinTextCompPro-Italic"/>
+              </a:rPr>
+              <a:t>XX</a:t>
+            </a:r>
+            <a:r>
+              <a:rPr lang="en-US" sz="2500" i="1" baseline="30000" dirty="0" smtClean="0">
+                <a:latin typeface="+mn-lt"/>
+                <a:cs typeface="PFDinTextCompPro-Italic"/>
+              </a:rPr>
+              <a:t>T</a:t>
+            </a:r>
+            <a:r>
+              <a:rPr lang="en-US" sz="3000" dirty="0">
+                <a:latin typeface="PFDinTextCompPro-Italic"/>
+                <a:cs typeface="PFDinTextCompPro-Italic"/>
+              </a:rPr>
+              <a:t>, and the columns of </a:t>
+            </a:r>
+            <a:r>
               <a:rPr lang="en-US" sz="2500" i="1" dirty="0">
                 <a:latin typeface="+mn-lt"/>
                 <a:cs typeface="PFDinTextCompPro-Italic"/>
               </a:rPr>
-              <a:t>AA</a:t>
-            </a:r>
-            <a:r>
-              <a:rPr lang="en-US" sz="2500" i="1" baseline="30000" dirty="0">
+              <a:t>V</a:t>
+            </a:r>
+            <a:r>
+              <a:rPr lang="en-US" sz="3000" dirty="0">
+                <a:latin typeface="PFDinTextCompPro-Italic"/>
+                <a:cs typeface="PFDinTextCompPro-Italic"/>
+              </a:rPr>
+              <a:t> are the eigenvectors of </a:t>
+            </a:r>
+            <a:r>
+              <a:rPr lang="en-US" sz="2500" i="1" dirty="0" smtClean="0">
                 <a:latin typeface="+mn-lt"/>
                 <a:cs typeface="PFDinTextCompPro-Italic"/>
               </a:rPr>
+              <a:t>X</a:t>
+            </a:r>
+            <a:r>
+              <a:rPr lang="en-US" sz="2500" i="1" baseline="30000" dirty="0" smtClean="0">
+                <a:latin typeface="+mn-lt"/>
+                <a:cs typeface="PFDinTextCompPro-Italic"/>
+              </a:rPr>
               <a:t>T</a:t>
             </a:r>
             <a:r>
-              <a:rPr lang="en-US" sz="3000" dirty="0">
-                <a:latin typeface="PFDinTextCompPro-Italic"/>
-                <a:cs typeface="PFDinTextCompPro-Italic"/>
-              </a:rPr>
-              <a:t>, and the columns of </a:t>
-            </a:r>
-            <a:r>
-              <a:rPr lang="en-US" sz="2500" i="1" dirty="0">
+              <a:rPr lang="en-US" sz="2500" i="1" dirty="0" smtClean="0">
                 <a:latin typeface="+mn-lt"/>
                 <a:cs typeface="PFDinTextCompPro-Italic"/>
               </a:rPr>
-              <a:t>V</a:t>
-            </a:r>
-            <a:r>
-              <a:rPr lang="en-US" sz="3000" dirty="0">
-                <a:latin typeface="PFDinTextCompPro-Italic"/>
-                <a:cs typeface="PFDinTextCompPro-Italic"/>
-              </a:rPr>
-              <a:t> are the eigenvectors of </a:t>
-            </a:r>
-            <a:r>
-              <a:rPr lang="en-US" sz="2500" i="1" dirty="0">
-                <a:latin typeface="+mn-lt"/>
-                <a:cs typeface="PFDinTextCompPro-Italic"/>
-              </a:rPr>
-              <a:t>A</a:t>
-            </a:r>
-            <a:r>
-              <a:rPr lang="en-US" sz="2500" i="1" baseline="30000" dirty="0">
-                <a:latin typeface="+mn-lt"/>
-                <a:cs typeface="PFDinTextCompPro-Italic"/>
-              </a:rPr>
-              <a:t>T</a:t>
-            </a:r>
-            <a:r>
-              <a:rPr lang="en-US" sz="2500" i="1" dirty="0">
-                <a:latin typeface="+mn-lt"/>
-                <a:cs typeface="PFDinTextCompPro-Italic"/>
-              </a:rPr>
-              <a:t>A</a:t>
+              <a:t>X</a:t>
             </a:r>
             <a:r>
               <a:rPr lang="en-US" sz="3000" dirty="0" smtClean="0">
@@ -31432,6 +31895,10 @@
               </a:rPr>
               <a:t>.</a:t>
             </a:r>
+            <a:endParaRPr lang="en-US" sz="3000" dirty="0" smtClean="0">
+              <a:latin typeface="PFDinTextCompPro-Italic"/>
+              <a:cs typeface="PFDinTextCompPro-Italic"/>
+            </a:endParaRPr>
           </a:p>
           <a:p>
             <a:pPr algn="l"/>
@@ -31454,56 +31921,70 @@
                 <a:latin typeface="+mn-lt"/>
                 <a:cs typeface="PFDinTextCompPro-Italic"/>
               </a:rPr>
-              <a:t>A</a:t>
+              <a:t>X</a:t>
+            </a:r>
+            <a:r>
+              <a:rPr lang="en-US" sz="3000" dirty="0" smtClean="0">
+                <a:latin typeface="PFDinTextCompPro-Italic"/>
+                <a:cs typeface="PFDinTextCompPro-Italic"/>
+              </a:rPr>
+              <a:t> </a:t>
             </a:r>
             <a:r>
               <a:rPr lang="en-US" sz="3000" dirty="0">
                 <a:latin typeface="PFDinTextCompPro-Italic"/>
                 <a:cs typeface="PFDinTextCompPro-Italic"/>
               </a:rPr>
-              <a:t> are the square roots of the eigenvalues of </a:t>
+              <a:t>are the square roots of the eigenvalues of </a:t>
+            </a:r>
+            <a:r>
+              <a:rPr lang="en-US" sz="2500" i="1" dirty="0" smtClean="0">
+                <a:latin typeface="+mn-lt"/>
+                <a:cs typeface="PFDinTextCompPro-Italic"/>
+              </a:rPr>
+              <a:t>XX</a:t>
+            </a:r>
+            <a:r>
+              <a:rPr lang="en-US" sz="2500" i="1" baseline="30000" dirty="0" smtClean="0">
+                <a:latin typeface="+mn-lt"/>
+                <a:cs typeface="PFDinTextCompPro-Italic"/>
+              </a:rPr>
+              <a:t>T</a:t>
+            </a:r>
+            <a:r>
+              <a:rPr lang="en-US" sz="3000" dirty="0" smtClean="0">
+                <a:latin typeface="PFDinTextCompPro-Italic"/>
+                <a:cs typeface="PFDinTextCompPro-Italic"/>
+              </a:rPr>
+              <a:t> </a:t>
+            </a:r>
+            <a:r>
+              <a:rPr lang="en-US" sz="3000" dirty="0">
+                <a:latin typeface="PFDinTextCompPro-Italic"/>
+                <a:cs typeface="PFDinTextCompPro-Italic"/>
+              </a:rPr>
+              <a:t>and </a:t>
+            </a:r>
+            <a:r>
+              <a:rPr lang="en-US" sz="2500" i="1" dirty="0" smtClean="0">
+                <a:latin typeface="+mn-lt"/>
+                <a:cs typeface="PFDinTextCompPro-Italic"/>
+              </a:rPr>
+              <a:t>X</a:t>
+            </a:r>
+            <a:r>
+              <a:rPr lang="en-US" sz="2500" i="1" baseline="30000" dirty="0" smtClean="0">
+                <a:latin typeface="+mn-lt"/>
+                <a:cs typeface="PFDinTextCompPro-Italic"/>
+              </a:rPr>
+              <a:t>T</a:t>
             </a:r>
             <a:r>
               <a:rPr lang="en-US" sz="2500" i="1" dirty="0">
                 <a:latin typeface="+mn-lt"/>
                 <a:cs typeface="PFDinTextCompPro-Italic"/>
               </a:rPr>
-              <a:t>AA</a:t>
-            </a:r>
-            <a:r>
-              <a:rPr lang="en-US" sz="2500" i="1" baseline="30000" dirty="0">
-                <a:latin typeface="+mn-lt"/>
-                <a:cs typeface="PFDinTextCompPro-Italic"/>
-              </a:rPr>
-              <a:t>T</a:t>
-            </a:r>
-            <a:r>
-              <a:rPr lang="en-US" sz="3000" dirty="0">
-                <a:latin typeface="PFDinTextCompPro-Italic"/>
-                <a:cs typeface="PFDinTextCompPro-Italic"/>
-              </a:rPr>
-              <a:t> and </a:t>
-            </a:r>
-            <a:r>
-              <a:rPr lang="en-US" sz="2500" i="1" dirty="0">
-                <a:latin typeface="+mn-lt"/>
-                <a:cs typeface="PFDinTextCompPro-Italic"/>
-              </a:rPr>
-              <a:t>A</a:t>
-            </a:r>
-            <a:r>
-              <a:rPr lang="en-US" sz="2500" i="1" baseline="30000" dirty="0">
-                <a:latin typeface="+mn-lt"/>
-                <a:cs typeface="PFDinTextCompPro-Italic"/>
-              </a:rPr>
-              <a:t>T</a:t>
-            </a:r>
-            <a:r>
-              <a:rPr lang="en-US" sz="2500" i="1" dirty="0">
-                <a:latin typeface="+mn-lt"/>
-                <a:cs typeface="PFDinTextCompPro-Italic"/>
-              </a:rPr>
-              <a:t>A</a:t>
+              <a:t>X</a:t>
             </a:r>
             <a:r>
               <a:rPr lang="en-US" sz="3000" dirty="0" smtClean="0">
@@ -31512,6 +31993,10 @@
               </a:rPr>
               <a:t>.</a:t>
             </a:r>
+            <a:endParaRPr lang="en-US" sz="3000" dirty="0" smtClean="0">
+              <a:latin typeface="PFDinTextCompPro-Italic"/>
+              <a:cs typeface="PFDinTextCompPro-Italic"/>
+            </a:endParaRPr>
           </a:p>
         </p:txBody>
       </p:sp>
@@ -31668,60 +32153,60 @@
               <a:t> are the eigenvectors of </a:t>
             </a:r>
             <a:r>
+              <a:rPr lang="en-US" sz="2500" i="1" dirty="0" smtClean="0">
+                <a:latin typeface="+mn-lt"/>
+                <a:cs typeface="PFDinTextCompPro-Italic"/>
+              </a:rPr>
+              <a:t>XX</a:t>
+            </a:r>
+            <a:r>
+              <a:rPr lang="en-US" sz="2500" i="1" baseline="30000" dirty="0" smtClean="0">
+                <a:latin typeface="+mn-lt"/>
+                <a:cs typeface="PFDinTextCompPro-Italic"/>
+              </a:rPr>
+              <a:t>T</a:t>
+            </a:r>
+            <a:r>
+              <a:rPr lang="en-US" sz="3000" dirty="0">
+                <a:latin typeface="PFDinTextCompPro-Italic"/>
+                <a:cs typeface="PFDinTextCompPro-Italic"/>
+              </a:rPr>
+              <a:t>, and the columns of </a:t>
+            </a:r>
+            <a:r>
               <a:rPr lang="en-US" sz="2500" i="1" dirty="0">
                 <a:latin typeface="+mn-lt"/>
                 <a:cs typeface="PFDinTextCompPro-Italic"/>
               </a:rPr>
-              <a:t>AA</a:t>
-            </a:r>
-            <a:r>
-              <a:rPr lang="en-US" sz="2500" i="1" baseline="30000" dirty="0">
+              <a:t>V</a:t>
+            </a:r>
+            <a:r>
+              <a:rPr lang="en-US" sz="3000" dirty="0">
+                <a:latin typeface="PFDinTextCompPro-Italic"/>
+                <a:cs typeface="PFDinTextCompPro-Italic"/>
+              </a:rPr>
+              <a:t> are the eigenvectors of </a:t>
+            </a:r>
+            <a:r>
+              <a:rPr lang="en-US" sz="2500" i="1" dirty="0" smtClean="0">
                 <a:latin typeface="+mn-lt"/>
                 <a:cs typeface="PFDinTextCompPro-Italic"/>
               </a:rPr>
+              <a:t>X</a:t>
+            </a:r>
+            <a:r>
+              <a:rPr lang="en-US" sz="2500" i="1" baseline="30000" dirty="0" smtClean="0">
+                <a:latin typeface="+mn-lt"/>
+                <a:cs typeface="PFDinTextCompPro-Italic"/>
+              </a:rPr>
               <a:t>T</a:t>
-            </a:r>
-            <a:r>
-              <a:rPr lang="en-US" sz="3000" dirty="0">
-                <a:latin typeface="PFDinTextCompPro-Italic"/>
-                <a:cs typeface="PFDinTextCompPro-Italic"/>
-              </a:rPr>
-              <a:t>, and the columns of </a:t>
             </a:r>
             <a:r>
               <a:rPr lang="en-US" sz="2500" i="1" dirty="0">
                 <a:latin typeface="+mn-lt"/>
                 <a:cs typeface="PFDinTextCompPro-Italic"/>
               </a:rPr>
-              <a:t>V</a:t>
-            </a:r>
-            <a:r>
-              <a:rPr lang="en-US" sz="3000" dirty="0">
-                <a:latin typeface="PFDinTextCompPro-Italic"/>
-                <a:cs typeface="PFDinTextCompPro-Italic"/>
-              </a:rPr>
-              <a:t> are the eigenvectors of </a:t>
-            </a:r>
-            <a:r>
-              <a:rPr lang="en-US" sz="2500" i="1" dirty="0">
-                <a:latin typeface="+mn-lt"/>
-                <a:cs typeface="PFDinTextCompPro-Italic"/>
-              </a:rPr>
-              <a:t>A</a:t>
-            </a:r>
-            <a:r>
-              <a:rPr lang="en-US" sz="2500" i="1" baseline="30000" dirty="0">
-                <a:latin typeface="+mn-lt"/>
-                <a:cs typeface="PFDinTextCompPro-Italic"/>
-              </a:rPr>
-              <a:t>T</a:t>
-            </a:r>
-            <a:r>
-              <a:rPr lang="en-US" sz="2500" i="1" dirty="0">
-                <a:latin typeface="+mn-lt"/>
-                <a:cs typeface="PFDinTextCompPro-Italic"/>
-              </a:rPr>
-              <a:t>A</a:t>
+              <a:t>X</a:t>
             </a:r>
             <a:r>
               <a:rPr lang="en-US" sz="3000" dirty="0" smtClean="0">
@@ -31730,6 +32215,10 @@
               </a:rPr>
               <a:t>.</a:t>
             </a:r>
+            <a:endParaRPr lang="en-US" sz="3000" dirty="0" smtClean="0">
+              <a:latin typeface="PFDinTextCompPro-Italic"/>
+              <a:cs typeface="PFDinTextCompPro-Italic"/>
+            </a:endParaRPr>
           </a:p>
           <a:p>
             <a:pPr algn="l"/>
@@ -31752,56 +32241,70 @@
                 <a:latin typeface="+mn-lt"/>
                 <a:cs typeface="PFDinTextCompPro-Italic"/>
               </a:rPr>
-              <a:t>A</a:t>
+              <a:t>X</a:t>
+            </a:r>
+            <a:r>
+              <a:rPr lang="en-US" sz="3000" dirty="0" smtClean="0">
+                <a:latin typeface="PFDinTextCompPro-Italic"/>
+                <a:cs typeface="PFDinTextCompPro-Italic"/>
+              </a:rPr>
+              <a:t> </a:t>
             </a:r>
             <a:r>
               <a:rPr lang="en-US" sz="3000" dirty="0">
                 <a:latin typeface="PFDinTextCompPro-Italic"/>
                 <a:cs typeface="PFDinTextCompPro-Italic"/>
               </a:rPr>
-              <a:t> are the square roots of the eigenvalues of </a:t>
+              <a:t>are the square roots of the eigenvalues of </a:t>
+            </a:r>
+            <a:r>
+              <a:rPr lang="en-US" sz="2500" i="1" dirty="0" smtClean="0">
+                <a:latin typeface="+mn-lt"/>
+                <a:cs typeface="PFDinTextCompPro-Italic"/>
+              </a:rPr>
+              <a:t>XX</a:t>
+            </a:r>
+            <a:r>
+              <a:rPr lang="en-US" sz="2500" i="1" baseline="30000" dirty="0" smtClean="0">
+                <a:latin typeface="+mn-lt"/>
+                <a:cs typeface="PFDinTextCompPro-Italic"/>
+              </a:rPr>
+              <a:t>T</a:t>
+            </a:r>
+            <a:r>
+              <a:rPr lang="en-US" sz="3000" dirty="0" smtClean="0">
+                <a:latin typeface="PFDinTextCompPro-Italic"/>
+                <a:cs typeface="PFDinTextCompPro-Italic"/>
+              </a:rPr>
+              <a:t> </a:t>
+            </a:r>
+            <a:r>
+              <a:rPr lang="en-US" sz="3000" dirty="0">
+                <a:latin typeface="PFDinTextCompPro-Italic"/>
+                <a:cs typeface="PFDinTextCompPro-Italic"/>
+              </a:rPr>
+              <a:t>and </a:t>
+            </a:r>
+            <a:r>
+              <a:rPr lang="en-US" sz="2500" i="1" dirty="0" smtClean="0">
+                <a:latin typeface="+mn-lt"/>
+                <a:cs typeface="PFDinTextCompPro-Italic"/>
+              </a:rPr>
+              <a:t>X</a:t>
+            </a:r>
+            <a:r>
+              <a:rPr lang="en-US" sz="2500" i="1" baseline="30000" dirty="0" smtClean="0">
+                <a:latin typeface="+mn-lt"/>
+                <a:cs typeface="PFDinTextCompPro-Italic"/>
+              </a:rPr>
+              <a:t>T</a:t>
             </a:r>
             <a:r>
               <a:rPr lang="en-US" sz="2500" i="1" dirty="0">
                 <a:latin typeface="+mn-lt"/>
                 <a:cs typeface="PFDinTextCompPro-Italic"/>
               </a:rPr>
-              <a:t>AA</a:t>
-            </a:r>
-            <a:r>
-              <a:rPr lang="en-US" sz="2500" i="1" baseline="30000" dirty="0">
-                <a:latin typeface="+mn-lt"/>
-                <a:cs typeface="PFDinTextCompPro-Italic"/>
-              </a:rPr>
-              <a:t>T</a:t>
-            </a:r>
-            <a:r>
-              <a:rPr lang="en-US" sz="3000" dirty="0">
-                <a:latin typeface="PFDinTextCompPro-Italic"/>
-                <a:cs typeface="PFDinTextCompPro-Italic"/>
-              </a:rPr>
-              <a:t> and </a:t>
-            </a:r>
-            <a:r>
-              <a:rPr lang="en-US" sz="2500" i="1" dirty="0">
-                <a:latin typeface="+mn-lt"/>
-                <a:cs typeface="PFDinTextCompPro-Italic"/>
-              </a:rPr>
-              <a:t>A</a:t>
-            </a:r>
-            <a:r>
-              <a:rPr lang="en-US" sz="2500" i="1" baseline="30000" dirty="0">
-                <a:latin typeface="+mn-lt"/>
-                <a:cs typeface="PFDinTextCompPro-Italic"/>
-              </a:rPr>
-              <a:t>T</a:t>
-            </a:r>
-            <a:r>
-              <a:rPr lang="en-US" sz="2500" i="1" dirty="0">
-                <a:latin typeface="+mn-lt"/>
-                <a:cs typeface="PFDinTextCompPro-Italic"/>
-              </a:rPr>
-              <a:t>A</a:t>
+              <a:t>X</a:t>
             </a:r>
             <a:r>
               <a:rPr lang="en-US" sz="3000" dirty="0" smtClean="0">
@@ -31810,6 +32313,10 @@
               </a:rPr>
               <a:t>.</a:t>
             </a:r>
+            <a:endParaRPr lang="en-US" sz="3000" dirty="0" smtClean="0">
+              <a:latin typeface="PFDinTextCompPro-Italic"/>
+              <a:cs typeface="PFDinTextCompPro-Italic"/>
+            </a:endParaRPr>
           </a:p>
         </p:txBody>
       </p:sp>
@@ -32379,18 +32886,25 @@
               <a:t>     matrix </a:t>
             </a:r>
             <a:r>
-              <a:rPr lang="en-US" sz="2500" i="1" dirty="0" smtClean="0">
+              <a:rPr lang="en-US" sz="2500" i="1" dirty="0">
                 <a:latin typeface="+mn-lt"/>
                 <a:cs typeface="PFDinTextCompPro-Italic"/>
               </a:rPr>
-              <a:t>A</a:t>
-            </a:r>
-            <a:r>
-              <a:rPr lang="en-US" sz="3000" dirty="0" smtClean="0">
-                <a:latin typeface="PFDinTextCompPro-Italic"/>
-                <a:cs typeface="PFDinTextCompPro-Italic"/>
-              </a:rPr>
-              <a:t>), we want to find the best </a:t>
+              <a:t>X</a:t>
+            </a:r>
+            <a:r>
+              <a:rPr lang="en-US" sz="3000" dirty="0" smtClean="0">
+                <a:latin typeface="PFDinTextCompPro-Italic"/>
+                <a:cs typeface="PFDinTextCompPro-Italic"/>
+              </a:rPr>
+              <a:t>)</a:t>
+            </a:r>
+            <a:r>
+              <a:rPr lang="en-US" sz="3000" dirty="0" smtClean="0">
+                <a:latin typeface="PFDinTextCompPro-Italic"/>
+                <a:cs typeface="PFDinTextCompPro-Italic"/>
+              </a:rPr>
+              <a:t>, we want to find the best </a:t>
             </a:r>
             <a:r>
               <a:rPr lang="en-US" sz="2500" i="1" dirty="0" smtClean="0">
@@ -32626,18 +33140,25 @@
               <a:t>     matrix </a:t>
             </a:r>
             <a:r>
-              <a:rPr lang="en-US" sz="2500" i="1" dirty="0" smtClean="0">
+              <a:rPr lang="en-US" sz="2500" i="1" dirty="0">
                 <a:latin typeface="+mn-lt"/>
                 <a:cs typeface="PFDinTextCompPro-Italic"/>
               </a:rPr>
-              <a:t>A</a:t>
-            </a:r>
-            <a:r>
-              <a:rPr lang="en-US" sz="3000" dirty="0" smtClean="0">
-                <a:latin typeface="PFDinTextCompPro-Italic"/>
-                <a:cs typeface="PFDinTextCompPro-Italic"/>
-              </a:rPr>
-              <a:t>), we want to find the best </a:t>
+              <a:t>X</a:t>
+            </a:r>
+            <a:r>
+              <a:rPr lang="en-US" sz="3000" dirty="0" smtClean="0">
+                <a:latin typeface="PFDinTextCompPro-Italic"/>
+                <a:cs typeface="PFDinTextCompPro-Italic"/>
+              </a:rPr>
+              <a:t>)</a:t>
+            </a:r>
+            <a:r>
+              <a:rPr lang="en-US" sz="3000" dirty="0" smtClean="0">
+                <a:latin typeface="PFDinTextCompPro-Italic"/>
+                <a:cs typeface="PFDinTextCompPro-Italic"/>
+              </a:rPr>
+              <a:t>, we want to find the best </a:t>
             </a:r>
             <a:r>
               <a:rPr lang="en-US" sz="2500" i="1" dirty="0" smtClean="0">
@@ -33154,18 +33675,25 @@
               <a:t>     matrix </a:t>
             </a:r>
             <a:r>
-              <a:rPr lang="en-US" sz="2500" i="1" dirty="0" smtClean="0">
+              <a:rPr lang="en-US" sz="2500" i="1" dirty="0">
                 <a:latin typeface="+mn-lt"/>
                 <a:cs typeface="PFDinTextCompPro-Italic"/>
               </a:rPr>
-              <a:t>A</a:t>
-            </a:r>
-            <a:r>
-              <a:rPr lang="en-US" sz="3000" dirty="0" smtClean="0">
-                <a:latin typeface="PFDinTextCompPro-Italic"/>
-                <a:cs typeface="PFDinTextCompPro-Italic"/>
-              </a:rPr>
-              <a:t>), we want to find the best </a:t>
+              <a:t>X</a:t>
+            </a:r>
+            <a:r>
+              <a:rPr lang="en-US" sz="3000" dirty="0" smtClean="0">
+                <a:latin typeface="PFDinTextCompPro-Italic"/>
+                <a:cs typeface="PFDinTextCompPro-Italic"/>
+              </a:rPr>
+              <a:t>)</a:t>
+            </a:r>
+            <a:r>
+              <a:rPr lang="en-US" sz="3000" dirty="0" smtClean="0">
+                <a:latin typeface="PFDinTextCompPro-Italic"/>
+                <a:cs typeface="PFDinTextCompPro-Italic"/>
+              </a:rPr>
+              <a:t>, we want to find the best </a:t>
             </a:r>
             <a:r>
               <a:rPr lang="en-US" sz="2500" i="1" dirty="0" smtClean="0">
@@ -36998,21 +37526,7 @@
                 <a:latin typeface="PFDinTextCompPro-Italic"/>
                 <a:cs typeface="PFDinTextCompPro-Italic"/>
               </a:rPr>
-              <a:t>But </a:t>
-            </a:r>
-            <a:r>
-              <a:rPr lang="en-US" sz="3000" dirty="0" smtClean="0">
-                <a:latin typeface="PFDinTextCompPro-Italic"/>
-                <a:cs typeface="PFDinTextCompPro-Italic"/>
-              </a:rPr>
-              <a:t>sometimes </a:t>
-            </a:r>
-            <a:r>
-              <a:rPr lang="en-US" sz="3000" dirty="0" smtClean="0">
-                <a:latin typeface="PFDinTextCompPro-Italic"/>
-                <a:cs typeface="PFDinTextCompPro-Italic"/>
-              </a:rPr>
-              <a:t>linear techniques are not sufficient.</a:t>
+              <a:t>But sometimes linear techniques are not sufficient.</a:t>
             </a:r>
           </a:p>
         </p:txBody>

</xml_diff>